<commit_message>
Minor changes after discussion with IK
</commit_message>
<xml_diff>
--- a/Springer_UAV_book/Pictures/Fig3.pptx
+++ b/Springer_UAV_book/Pictures/Fig3.pptx
@@ -6,6 +6,7 @@
   </p:sldMasterIdLst>
   <p:sldIdLst>
     <p:sldId id="261" r:id="rId2"/>
+    <p:sldId id="262" r:id="rId3"/>
   </p:sldIdLst>
   <p:sldSz cx="9144000" cy="6858000" type="screen4x3"/>
   <p:notesSz cx="6858000" cy="9144000"/>
@@ -289,7 +290,7 @@
             <a:fld id="{1D8BD707-D9CF-40AE-B4C6-C98DA3205C09}" type="datetimeFigureOut">
               <a:rPr lang="en-US" smtClean="0"/>
               <a:pPr/>
-              <a:t>4/11/2012</a:t>
+              <a:t>8/9/2012</a:t>
             </a:fld>
             <a:endParaRPr lang="en-US"/>
           </a:p>
@@ -456,7 +457,7 @@
             <a:fld id="{1D8BD707-D9CF-40AE-B4C6-C98DA3205C09}" type="datetimeFigureOut">
               <a:rPr lang="en-US" smtClean="0"/>
               <a:pPr/>
-              <a:t>4/11/2012</a:t>
+              <a:t>8/9/2012</a:t>
             </a:fld>
             <a:endParaRPr lang="en-US"/>
           </a:p>
@@ -633,7 +634,7 @@
             <a:fld id="{1D8BD707-D9CF-40AE-B4C6-C98DA3205C09}" type="datetimeFigureOut">
               <a:rPr lang="en-US" smtClean="0"/>
               <a:pPr/>
-              <a:t>4/11/2012</a:t>
+              <a:t>8/9/2012</a:t>
             </a:fld>
             <a:endParaRPr lang="en-US"/>
           </a:p>
@@ -800,7 +801,7 @@
             <a:fld id="{1D8BD707-D9CF-40AE-B4C6-C98DA3205C09}" type="datetimeFigureOut">
               <a:rPr lang="en-US" smtClean="0"/>
               <a:pPr/>
-              <a:t>4/11/2012</a:t>
+              <a:t>8/9/2012</a:t>
             </a:fld>
             <a:endParaRPr lang="en-US"/>
           </a:p>
@@ -1043,7 +1044,7 @@
             <a:fld id="{1D8BD707-D9CF-40AE-B4C6-C98DA3205C09}" type="datetimeFigureOut">
               <a:rPr lang="en-US" smtClean="0"/>
               <a:pPr/>
-              <a:t>4/11/2012</a:t>
+              <a:t>8/9/2012</a:t>
             </a:fld>
             <a:endParaRPr lang="en-US"/>
           </a:p>
@@ -1328,7 +1329,7 @@
             <a:fld id="{1D8BD707-D9CF-40AE-B4C6-C98DA3205C09}" type="datetimeFigureOut">
               <a:rPr lang="en-US" smtClean="0"/>
               <a:pPr/>
-              <a:t>4/11/2012</a:t>
+              <a:t>8/9/2012</a:t>
             </a:fld>
             <a:endParaRPr lang="en-US"/>
           </a:p>
@@ -1747,7 +1748,7 @@
             <a:fld id="{1D8BD707-D9CF-40AE-B4C6-C98DA3205C09}" type="datetimeFigureOut">
               <a:rPr lang="en-US" smtClean="0"/>
               <a:pPr/>
-              <a:t>4/11/2012</a:t>
+              <a:t>8/9/2012</a:t>
             </a:fld>
             <a:endParaRPr lang="en-US"/>
           </a:p>
@@ -1862,7 +1863,7 @@
             <a:fld id="{1D8BD707-D9CF-40AE-B4C6-C98DA3205C09}" type="datetimeFigureOut">
               <a:rPr lang="en-US" smtClean="0"/>
               <a:pPr/>
-              <a:t>4/11/2012</a:t>
+              <a:t>8/9/2012</a:t>
             </a:fld>
             <a:endParaRPr lang="en-US"/>
           </a:p>
@@ -1954,7 +1955,7 @@
             <a:fld id="{1D8BD707-D9CF-40AE-B4C6-C98DA3205C09}" type="datetimeFigureOut">
               <a:rPr lang="en-US" smtClean="0"/>
               <a:pPr/>
-              <a:t>4/11/2012</a:t>
+              <a:t>8/9/2012</a:t>
             </a:fld>
             <a:endParaRPr lang="en-US"/>
           </a:p>
@@ -2228,7 +2229,7 @@
             <a:fld id="{1D8BD707-D9CF-40AE-B4C6-C98DA3205C09}" type="datetimeFigureOut">
               <a:rPr lang="en-US" smtClean="0"/>
               <a:pPr/>
-              <a:t>4/11/2012</a:t>
+              <a:t>8/9/2012</a:t>
             </a:fld>
             <a:endParaRPr lang="en-US"/>
           </a:p>
@@ -2478,7 +2479,7 @@
             <a:fld id="{1D8BD707-D9CF-40AE-B4C6-C98DA3205C09}" type="datetimeFigureOut">
               <a:rPr lang="en-US" smtClean="0"/>
               <a:pPr/>
-              <a:t>4/11/2012</a:t>
+              <a:t>8/9/2012</a:t>
             </a:fld>
             <a:endParaRPr lang="en-US"/>
           </a:p>
@@ -2688,7 +2689,7 @@
             <a:fld id="{1D8BD707-D9CF-40AE-B4C6-C98DA3205C09}" type="datetimeFigureOut">
               <a:rPr lang="en-US" smtClean="0"/>
               <a:pPr/>
-              <a:t>4/11/2012</a:t>
+              <a:t>8/9/2012</a:t>
             </a:fld>
             <a:endParaRPr lang="en-US"/>
           </a:p>
@@ -4343,6 +4344,1470 @@
           </a:fontRef>
         </p:style>
       </p:cxnSp>
+    </p:spTree>
+  </p:cSld>
+  <p:clrMapOvr>
+    <a:masterClrMapping/>
+  </p:clrMapOvr>
+  <p:timing>
+    <p:tnLst>
+      <p:par>
+        <p:cTn id="1" dur="indefinite" restart="never" nodeType="tmRoot"/>
+      </p:par>
+    </p:tnLst>
+  </p:timing>
+</p:sld>
+</file>
+
+<file path=ppt/slides/slide2.xml><?xml version="1.0" encoding="utf-8"?>
+<p:sld xmlns:a="http://schemas.openxmlformats.org/drawingml/2006/main" xmlns:r="http://schemas.openxmlformats.org/officeDocument/2006/relationships" xmlns:p="http://schemas.openxmlformats.org/presentationml/2006/main">
+  <p:cSld>
+    <p:spTree>
+      <p:nvGrpSpPr>
+        <p:cNvPr id="1" name=""/>
+        <p:cNvGrpSpPr/>
+        <p:nvPr/>
+      </p:nvGrpSpPr>
+      <p:grpSpPr>
+        <a:xfrm>
+          <a:off x="0" y="0"/>
+          <a:ext cx="0" cy="0"/>
+          <a:chOff x="0" y="0"/>
+          <a:chExt cx="0" cy="0"/>
+        </a:xfrm>
+      </p:grpSpPr>
+      <p:sp>
+        <p:nvSpPr>
+          <p:cNvPr id="157" name="Rectangle 156"/>
+          <p:cNvSpPr/>
+          <p:nvPr/>
+        </p:nvSpPr>
+        <p:spPr>
+          <a:xfrm rot="3418305">
+            <a:off x="5147555" y="2412717"/>
+            <a:ext cx="345383" cy="283109"/>
+          </a:xfrm>
+          <a:prstGeom prst="rect">
+            <a:avLst/>
+          </a:prstGeom>
+          <a:solidFill>
+            <a:schemeClr val="bg1">
+              <a:lumMod val="85000"/>
+              <a:alpha val="80000"/>
+            </a:schemeClr>
+          </a:solidFill>
+          <a:ln w="12700">
+            <a:solidFill>
+              <a:schemeClr val="tx1"/>
+            </a:solidFill>
+            <a:headEnd type="stealth"/>
+            <a:tailEnd type="none"/>
+          </a:ln>
+        </p:spPr>
+        <p:style>
+          <a:lnRef idx="1">
+            <a:schemeClr val="accent1"/>
+          </a:lnRef>
+          <a:fillRef idx="0">
+            <a:schemeClr val="accent1"/>
+          </a:fillRef>
+          <a:effectRef idx="0">
+            <a:schemeClr val="accent1"/>
+          </a:effectRef>
+          <a:fontRef idx="minor">
+            <a:schemeClr val="tx1"/>
+          </a:fontRef>
+        </p:style>
+        <p:txBody>
+          <a:bodyPr rtlCol="0" anchor="ctr"/>
+          <a:lstStyle/>
+          <a:p>
+            <a:pPr algn="ctr"/>
+            <a:endParaRPr lang="en-US">
+              <a:solidFill>
+                <a:schemeClr val="tx1"/>
+              </a:solidFill>
+            </a:endParaRPr>
+          </a:p>
+        </p:txBody>
+      </p:sp>
+      <p:sp>
+        <p:nvSpPr>
+          <p:cNvPr id="66" name="Arc 65"/>
+          <p:cNvSpPr/>
+          <p:nvPr/>
+        </p:nvSpPr>
+        <p:spPr>
+          <a:xfrm>
+            <a:off x="2827175" y="2771186"/>
+            <a:ext cx="3522013" cy="1315622"/>
+          </a:xfrm>
+          <a:prstGeom prst="arc">
+            <a:avLst>
+              <a:gd name="adj1" fmla="val 11486"/>
+              <a:gd name="adj2" fmla="val 10808031"/>
+            </a:avLst>
+          </a:prstGeom>
+          <a:solidFill>
+            <a:schemeClr val="bg1">
+              <a:lumMod val="85000"/>
+              <a:alpha val="49000"/>
+            </a:schemeClr>
+          </a:solidFill>
+          <a:ln w="19050">
+            <a:solidFill>
+              <a:schemeClr val="tx1"/>
+            </a:solidFill>
+          </a:ln>
+        </p:spPr>
+        <p:style>
+          <a:lnRef idx="1">
+            <a:schemeClr val="accent1"/>
+          </a:lnRef>
+          <a:fillRef idx="0">
+            <a:schemeClr val="accent1"/>
+          </a:fillRef>
+          <a:effectRef idx="0">
+            <a:schemeClr val="accent1"/>
+          </a:effectRef>
+          <a:fontRef idx="minor">
+            <a:schemeClr val="tx1"/>
+          </a:fontRef>
+        </p:style>
+        <p:txBody>
+          <a:bodyPr rtlCol="0" anchor="ctr"/>
+          <a:lstStyle/>
+          <a:p>
+            <a:pPr algn="ctr"/>
+            <a:endParaRPr lang="en-US"/>
+          </a:p>
+        </p:txBody>
+      </p:sp>
+      <p:sp>
+        <p:nvSpPr>
+          <p:cNvPr id="137" name="Arc 136"/>
+          <p:cNvSpPr/>
+          <p:nvPr/>
+        </p:nvSpPr>
+        <p:spPr>
+          <a:xfrm rot="10800000">
+            <a:off x="2820565" y="2792958"/>
+            <a:ext cx="3536302" cy="1315619"/>
+          </a:xfrm>
+          <a:prstGeom prst="arc">
+            <a:avLst>
+              <a:gd name="adj1" fmla="val 11355"/>
+              <a:gd name="adj2" fmla="val 10808031"/>
+            </a:avLst>
+          </a:prstGeom>
+          <a:solidFill>
+            <a:schemeClr val="bg1">
+              <a:lumMod val="85000"/>
+              <a:alpha val="49000"/>
+            </a:schemeClr>
+          </a:solidFill>
+          <a:ln w="19050">
+            <a:solidFill>
+              <a:schemeClr val="tx1"/>
+            </a:solidFill>
+            <a:prstDash val="dash"/>
+          </a:ln>
+        </p:spPr>
+        <p:style>
+          <a:lnRef idx="1">
+            <a:schemeClr val="accent1"/>
+          </a:lnRef>
+          <a:fillRef idx="0">
+            <a:schemeClr val="accent1"/>
+          </a:fillRef>
+          <a:effectRef idx="0">
+            <a:schemeClr val="accent1"/>
+          </a:effectRef>
+          <a:fontRef idx="minor">
+            <a:schemeClr val="tx1"/>
+          </a:fontRef>
+        </p:style>
+        <p:txBody>
+          <a:bodyPr rtlCol="0" anchor="ctr"/>
+          <a:lstStyle/>
+          <a:p>
+            <a:pPr algn="ctr"/>
+            <a:endParaRPr lang="en-US"/>
+          </a:p>
+        </p:txBody>
+      </p:sp>
+      <p:sp>
+        <p:nvSpPr>
+          <p:cNvPr id="43" name="Oval 42"/>
+          <p:cNvSpPr/>
+          <p:nvPr/>
+        </p:nvSpPr>
+        <p:spPr>
+          <a:xfrm>
+            <a:off x="2813374" y="1670374"/>
+            <a:ext cx="3536302" cy="3536302"/>
+          </a:xfrm>
+          <a:prstGeom prst="ellipse">
+            <a:avLst/>
+          </a:prstGeom>
+          <a:ln w="25400">
+            <a:solidFill>
+              <a:schemeClr val="tx1"/>
+            </a:solidFill>
+            <a:tailEnd type="stealth" w="lg" len="med"/>
+          </a:ln>
+        </p:spPr>
+        <p:style>
+          <a:lnRef idx="1">
+            <a:schemeClr val="accent1"/>
+          </a:lnRef>
+          <a:fillRef idx="0">
+            <a:schemeClr val="accent1"/>
+          </a:fillRef>
+          <a:effectRef idx="0">
+            <a:schemeClr val="accent1"/>
+          </a:effectRef>
+          <a:fontRef idx="minor">
+            <a:schemeClr val="tx1"/>
+          </a:fontRef>
+        </p:style>
+        <p:txBody>
+          <a:bodyPr rtlCol="0" anchor="ctr"/>
+          <a:lstStyle/>
+          <a:p>
+            <a:pPr algn="ctr"/>
+            <a:endParaRPr lang="en-US"/>
+          </a:p>
+        </p:txBody>
+      </p:sp>
+      <p:sp>
+        <p:nvSpPr>
+          <p:cNvPr id="81" name="TextBox 80"/>
+          <p:cNvSpPr txBox="1"/>
+          <p:nvPr/>
+        </p:nvSpPr>
+        <p:spPr>
+          <a:xfrm>
+            <a:off x="2313991" y="4749283"/>
+            <a:ext cx="961053" cy="523220"/>
+          </a:xfrm>
+          <a:prstGeom prst="rect">
+            <a:avLst/>
+          </a:prstGeom>
+          <a:noFill/>
+        </p:spPr>
+        <p:txBody>
+          <a:bodyPr wrap="square" rtlCol="0">
+            <a:spAutoFit/>
+          </a:bodyPr>
+          <a:lstStyle/>
+          <a:p>
+            <a:r>
+              <a:rPr lang="en-US" sz="1400" dirty="0" smtClean="0">
+                <a:latin typeface="Garamond" pitchFamily="18" charset="0"/>
+              </a:rPr>
+              <a:t>Greenwich meridian</a:t>
+            </a:r>
+            <a:endParaRPr lang="en-US" sz="1400" dirty="0">
+              <a:latin typeface="Garamond" pitchFamily="18" charset="0"/>
+            </a:endParaRPr>
+          </a:p>
+        </p:txBody>
+      </p:sp>
+      <p:sp>
+        <p:nvSpPr>
+          <p:cNvPr id="64" name="TextBox 63"/>
+          <p:cNvSpPr txBox="1"/>
+          <p:nvPr/>
+        </p:nvSpPr>
+        <p:spPr>
+          <a:xfrm>
+            <a:off x="6456784" y="3806889"/>
+            <a:ext cx="1362269" cy="307777"/>
+          </a:xfrm>
+          <a:prstGeom prst="rect">
+            <a:avLst/>
+          </a:prstGeom>
+          <a:noFill/>
+        </p:spPr>
+        <p:txBody>
+          <a:bodyPr wrap="square" rtlCol="0">
+            <a:spAutoFit/>
+          </a:bodyPr>
+          <a:lstStyle/>
+          <a:p>
+            <a:r>
+              <a:rPr lang="en-US" sz="1400" dirty="0" smtClean="0">
+                <a:latin typeface="Garamond" pitchFamily="18" charset="0"/>
+              </a:rPr>
+              <a:t>Equatorial plane</a:t>
+            </a:r>
+            <a:endParaRPr lang="en-US" sz="1400" dirty="0">
+              <a:latin typeface="Garamond" pitchFamily="18" charset="0"/>
+            </a:endParaRPr>
+          </a:p>
+        </p:txBody>
+      </p:sp>
+      <p:sp>
+        <p:nvSpPr>
+          <p:cNvPr id="95" name="Arc 94"/>
+          <p:cNvSpPr/>
+          <p:nvPr/>
+        </p:nvSpPr>
+        <p:spPr>
+          <a:xfrm rot="10800000">
+            <a:off x="4366726" y="1726163"/>
+            <a:ext cx="457202" cy="214604"/>
+          </a:xfrm>
+          <a:prstGeom prst="arc">
+            <a:avLst>
+              <a:gd name="adj1" fmla="val 11263464"/>
+              <a:gd name="adj2" fmla="val 10883140"/>
+            </a:avLst>
+          </a:prstGeom>
+          <a:ln w="12700">
+            <a:solidFill>
+              <a:schemeClr val="tx1"/>
+            </a:solidFill>
+            <a:prstDash val="solid"/>
+          </a:ln>
+        </p:spPr>
+        <p:style>
+          <a:lnRef idx="1">
+            <a:schemeClr val="accent1"/>
+          </a:lnRef>
+          <a:fillRef idx="0">
+            <a:schemeClr val="accent1"/>
+          </a:fillRef>
+          <a:effectRef idx="0">
+            <a:schemeClr val="accent1"/>
+          </a:effectRef>
+          <a:fontRef idx="minor">
+            <a:schemeClr val="tx1"/>
+          </a:fontRef>
+        </p:style>
+        <p:txBody>
+          <a:bodyPr rtlCol="0" anchor="ctr"/>
+          <a:lstStyle/>
+          <a:p>
+            <a:pPr algn="ctr"/>
+            <a:endParaRPr lang="en-US"/>
+          </a:p>
+        </p:txBody>
+      </p:sp>
+      <p:sp>
+        <p:nvSpPr>
+          <p:cNvPr id="100" name="Arc 99"/>
+          <p:cNvSpPr/>
+          <p:nvPr/>
+        </p:nvSpPr>
+        <p:spPr>
+          <a:xfrm rot="10800000">
+            <a:off x="4338733" y="1194318"/>
+            <a:ext cx="522516" cy="289250"/>
+          </a:xfrm>
+          <a:prstGeom prst="arc">
+            <a:avLst>
+              <a:gd name="adj1" fmla="val 9052599"/>
+              <a:gd name="adj2" fmla="val 1722148"/>
+            </a:avLst>
+          </a:prstGeom>
+          <a:ln w="15875">
+            <a:solidFill>
+              <a:schemeClr val="tx1"/>
+            </a:solidFill>
+            <a:prstDash val="sysDash"/>
+            <a:headEnd type="triangle"/>
+            <a:tailEnd type="none" w="lg" len="med"/>
+          </a:ln>
+        </p:spPr>
+        <p:style>
+          <a:lnRef idx="1">
+            <a:schemeClr val="accent1"/>
+          </a:lnRef>
+          <a:fillRef idx="0">
+            <a:schemeClr val="accent1"/>
+          </a:fillRef>
+          <a:effectRef idx="0">
+            <a:schemeClr val="accent1"/>
+          </a:effectRef>
+          <a:fontRef idx="minor">
+            <a:schemeClr val="tx1"/>
+          </a:fontRef>
+        </p:style>
+        <p:txBody>
+          <a:bodyPr rtlCol="0" anchor="ctr"/>
+          <a:lstStyle/>
+          <a:p>
+            <a:pPr algn="ctr"/>
+            <a:endParaRPr lang="en-US"/>
+          </a:p>
+        </p:txBody>
+      </p:sp>
+      <p:cxnSp>
+        <p:nvCxnSpPr>
+          <p:cNvPr id="104" name="Straight Arrow Connector 103"/>
+          <p:cNvCxnSpPr>
+            <a:stCxn id="64" idx="1"/>
+          </p:cNvCxnSpPr>
+          <p:nvPr/>
+        </p:nvCxnSpPr>
+        <p:spPr>
+          <a:xfrm flipH="1" flipV="1">
+            <a:off x="5822302" y="3732245"/>
+            <a:ext cx="634482" cy="228533"/>
+          </a:xfrm>
+          <a:prstGeom prst="straightConnector1">
+            <a:avLst/>
+          </a:prstGeom>
+          <a:ln w="15875">
+            <a:solidFill>
+              <a:schemeClr val="tx1"/>
+            </a:solidFill>
+            <a:tailEnd type="stealth" w="lg" len="med"/>
+          </a:ln>
+        </p:spPr>
+        <p:style>
+          <a:lnRef idx="1">
+            <a:schemeClr val="accent1"/>
+          </a:lnRef>
+          <a:fillRef idx="0">
+            <a:schemeClr val="accent1"/>
+          </a:fillRef>
+          <a:effectRef idx="0">
+            <a:schemeClr val="accent1"/>
+          </a:effectRef>
+          <a:fontRef idx="minor">
+            <a:schemeClr val="tx1"/>
+          </a:fontRef>
+        </p:style>
+      </p:cxnSp>
+      <p:sp>
+        <p:nvSpPr>
+          <p:cNvPr id="109" name="Oval 108"/>
+          <p:cNvSpPr/>
+          <p:nvPr/>
+        </p:nvSpPr>
+        <p:spPr>
+          <a:xfrm>
+            <a:off x="5273740" y="2494579"/>
+            <a:ext cx="90001" cy="90001"/>
+          </a:xfrm>
+          <a:prstGeom prst="ellipse">
+            <a:avLst/>
+          </a:prstGeom>
+          <a:solidFill>
+            <a:schemeClr val="tx1"/>
+          </a:solidFill>
+          <a:ln w="25400">
+            <a:solidFill>
+              <a:schemeClr val="tx1"/>
+            </a:solidFill>
+            <a:tailEnd type="stealth" w="lg" len="med"/>
+          </a:ln>
+        </p:spPr>
+        <p:style>
+          <a:lnRef idx="1">
+            <a:schemeClr val="accent1"/>
+          </a:lnRef>
+          <a:fillRef idx="0">
+            <a:schemeClr val="accent1"/>
+          </a:fillRef>
+          <a:effectRef idx="0">
+            <a:schemeClr val="accent1"/>
+          </a:effectRef>
+          <a:fontRef idx="minor">
+            <a:schemeClr val="tx1"/>
+          </a:fontRef>
+        </p:style>
+        <p:txBody>
+          <a:bodyPr rtlCol="0" anchor="ctr"/>
+          <a:lstStyle/>
+          <a:p>
+            <a:pPr algn="ctr"/>
+            <a:endParaRPr lang="en-US"/>
+          </a:p>
+        </p:txBody>
+      </p:sp>
+      <p:sp>
+        <p:nvSpPr>
+          <p:cNvPr id="122" name="Arc 121"/>
+          <p:cNvSpPr/>
+          <p:nvPr/>
+        </p:nvSpPr>
+        <p:spPr>
+          <a:xfrm>
+            <a:off x="3306147" y="2864497"/>
+            <a:ext cx="2572138" cy="1113450"/>
+          </a:xfrm>
+          <a:prstGeom prst="arc">
+            <a:avLst>
+              <a:gd name="adj1" fmla="val 1557383"/>
+              <a:gd name="adj2" fmla="val 8982820"/>
+            </a:avLst>
+          </a:prstGeom>
+          <a:ln w="12700">
+            <a:solidFill>
+              <a:schemeClr val="tx1"/>
+            </a:solidFill>
+            <a:headEnd type="stealth"/>
+            <a:tailEnd type="none"/>
+          </a:ln>
+        </p:spPr>
+        <p:style>
+          <a:lnRef idx="1">
+            <a:schemeClr val="accent1"/>
+          </a:lnRef>
+          <a:fillRef idx="0">
+            <a:schemeClr val="accent1"/>
+          </a:fillRef>
+          <a:effectRef idx="0">
+            <a:schemeClr val="accent1"/>
+          </a:effectRef>
+          <a:fontRef idx="minor">
+            <a:schemeClr val="tx1"/>
+          </a:fontRef>
+        </p:style>
+        <p:txBody>
+          <a:bodyPr rtlCol="0" anchor="ctr"/>
+          <a:lstStyle/>
+          <a:p>
+            <a:pPr algn="ctr"/>
+            <a:endParaRPr lang="en-US"/>
+          </a:p>
+        </p:txBody>
+      </p:sp>
+      <p:graphicFrame>
+        <p:nvGraphicFramePr>
+          <p:cNvPr id="15382" name="Object 22"/>
+          <p:cNvGraphicFramePr>
+            <a:graphicFrameLocks noChangeAspect="1"/>
+          </p:cNvGraphicFramePr>
+          <p:nvPr/>
+        </p:nvGraphicFramePr>
+        <p:xfrm>
+          <a:off x="4849813" y="1082675"/>
+          <a:ext cx="377825" cy="446088"/>
+        </p:xfrm>
+        <a:graphic>
+          <a:graphicData uri="http://schemas.openxmlformats.org/presentationml/2006/ole">
+            <p:oleObj spid="_x0000_s28676" name="Equation" r:id="rId3" imgW="203040" imgH="241200" progId="Equation.DSMT4">
+              <p:embed/>
+            </p:oleObj>
+          </a:graphicData>
+        </a:graphic>
+      </p:graphicFrame>
+      <p:graphicFrame>
+        <p:nvGraphicFramePr>
+          <p:cNvPr id="15383" name="Object 23"/>
+          <p:cNvGraphicFramePr>
+            <a:graphicFrameLocks noChangeAspect="1"/>
+          </p:cNvGraphicFramePr>
+          <p:nvPr/>
+        </p:nvGraphicFramePr>
+        <p:xfrm>
+          <a:off x="2411380" y="4397084"/>
+          <a:ext cx="306388" cy="422275"/>
+        </p:xfrm>
+        <a:graphic>
+          <a:graphicData uri="http://schemas.openxmlformats.org/presentationml/2006/ole">
+            <p:oleObj spid="_x0000_s28677" name="Equation" r:id="rId4" imgW="164880" imgH="228600" progId="Equation.DSMT4">
+              <p:embed/>
+            </p:oleObj>
+          </a:graphicData>
+        </a:graphic>
+      </p:graphicFrame>
+      <p:graphicFrame>
+        <p:nvGraphicFramePr>
+          <p:cNvPr id="15384" name="Object 24"/>
+          <p:cNvGraphicFramePr>
+            <a:graphicFrameLocks noChangeAspect="1"/>
+          </p:cNvGraphicFramePr>
+          <p:nvPr/>
+        </p:nvGraphicFramePr>
+        <p:xfrm>
+          <a:off x="7283450" y="3233738"/>
+          <a:ext cx="330200" cy="422275"/>
+        </p:xfrm>
+        <a:graphic>
+          <a:graphicData uri="http://schemas.openxmlformats.org/presentationml/2006/ole">
+            <p:oleObj spid="_x0000_s28678" name="Equation" r:id="rId5" imgW="177480" imgH="228600" progId="Equation.DSMT4">
+              <p:embed/>
+            </p:oleObj>
+          </a:graphicData>
+        </a:graphic>
+      </p:graphicFrame>
+      <p:graphicFrame>
+        <p:nvGraphicFramePr>
+          <p:cNvPr id="15385" name="Object 25"/>
+          <p:cNvGraphicFramePr>
+            <a:graphicFrameLocks noChangeAspect="1"/>
+          </p:cNvGraphicFramePr>
+          <p:nvPr/>
+        </p:nvGraphicFramePr>
+        <p:xfrm>
+          <a:off x="3916363" y="830263"/>
+          <a:ext cx="587375" cy="422275"/>
+        </p:xfrm>
+        <a:graphic>
+          <a:graphicData uri="http://schemas.openxmlformats.org/presentationml/2006/ole">
+            <p:oleObj spid="_x0000_s28679" name="Equation" r:id="rId6" imgW="317160" imgH="228600" progId="Equation.DSMT4">
+              <p:embed/>
+            </p:oleObj>
+          </a:graphicData>
+        </a:graphic>
+      </p:graphicFrame>
+      <p:graphicFrame>
+        <p:nvGraphicFramePr>
+          <p:cNvPr id="15386" name="Object 26"/>
+          <p:cNvGraphicFramePr>
+            <a:graphicFrameLocks noChangeAspect="1"/>
+          </p:cNvGraphicFramePr>
+          <p:nvPr/>
+        </p:nvGraphicFramePr>
+        <p:xfrm>
+          <a:off x="6006751" y="1595535"/>
+          <a:ext cx="980466" cy="337392"/>
+        </p:xfrm>
+        <a:graphic>
+          <a:graphicData uri="http://schemas.openxmlformats.org/presentationml/2006/ole">
+            <p:oleObj spid="_x0000_s28680" name="Equation" r:id="rId7" imgW="660240" imgH="228600" progId="Equation.DSMT4">
+              <p:embed/>
+            </p:oleObj>
+          </a:graphicData>
+        </a:graphic>
+      </p:graphicFrame>
+      <p:cxnSp>
+        <p:nvCxnSpPr>
+          <p:cNvPr id="41" name="Straight Arrow Connector 40"/>
+          <p:cNvCxnSpPr/>
+          <p:nvPr/>
+        </p:nvCxnSpPr>
+        <p:spPr>
+          <a:xfrm flipV="1">
+            <a:off x="4572617" y="3424335"/>
+            <a:ext cx="2695930" cy="5479"/>
+          </a:xfrm>
+          <a:prstGeom prst="straightConnector1">
+            <a:avLst/>
+          </a:prstGeom>
+          <a:ln w="15875">
+            <a:solidFill>
+              <a:schemeClr val="tx1"/>
+            </a:solidFill>
+            <a:tailEnd type="stealth" w="lg" len="med"/>
+          </a:ln>
+        </p:spPr>
+        <p:style>
+          <a:lnRef idx="1">
+            <a:schemeClr val="accent1"/>
+          </a:lnRef>
+          <a:fillRef idx="0">
+            <a:schemeClr val="accent1"/>
+          </a:fillRef>
+          <a:effectRef idx="0">
+            <a:schemeClr val="accent1"/>
+          </a:effectRef>
+          <a:fontRef idx="minor">
+            <a:schemeClr val="tx1"/>
+          </a:fontRef>
+        </p:style>
+      </p:cxnSp>
+      <p:cxnSp>
+        <p:nvCxnSpPr>
+          <p:cNvPr id="71" name="Straight Arrow Connector 70"/>
+          <p:cNvCxnSpPr/>
+          <p:nvPr/>
+        </p:nvCxnSpPr>
+        <p:spPr>
+          <a:xfrm flipH="1">
+            <a:off x="2724539" y="3442994"/>
+            <a:ext cx="1833561" cy="1017039"/>
+          </a:xfrm>
+          <a:prstGeom prst="straightConnector1">
+            <a:avLst/>
+          </a:prstGeom>
+          <a:ln w="15875">
+            <a:solidFill>
+              <a:schemeClr val="tx1"/>
+            </a:solidFill>
+            <a:tailEnd type="stealth" w="lg" len="med"/>
+          </a:ln>
+        </p:spPr>
+        <p:style>
+          <a:lnRef idx="1">
+            <a:schemeClr val="accent1"/>
+          </a:lnRef>
+          <a:fillRef idx="0">
+            <a:schemeClr val="accent1"/>
+          </a:fillRef>
+          <a:effectRef idx="0">
+            <a:schemeClr val="accent1"/>
+          </a:effectRef>
+          <a:fontRef idx="minor">
+            <a:schemeClr val="tx1"/>
+          </a:fontRef>
+        </p:style>
+      </p:cxnSp>
+      <p:sp>
+        <p:nvSpPr>
+          <p:cNvPr id="70" name="Arc 69"/>
+          <p:cNvSpPr/>
+          <p:nvPr/>
+        </p:nvSpPr>
+        <p:spPr>
+          <a:xfrm rot="6251086">
+            <a:off x="2840016" y="2474022"/>
+            <a:ext cx="3541615" cy="1931205"/>
+          </a:xfrm>
+          <a:prstGeom prst="arc">
+            <a:avLst>
+              <a:gd name="adj1" fmla="val 8293"/>
+              <a:gd name="adj2" fmla="val 10742641"/>
+            </a:avLst>
+          </a:prstGeom>
+          <a:ln w="15875">
+            <a:solidFill>
+              <a:schemeClr val="tx1"/>
+            </a:solidFill>
+          </a:ln>
+        </p:spPr>
+        <p:style>
+          <a:lnRef idx="1">
+            <a:schemeClr val="accent1"/>
+          </a:lnRef>
+          <a:fillRef idx="0">
+            <a:schemeClr val="accent1"/>
+          </a:fillRef>
+          <a:effectRef idx="0">
+            <a:schemeClr val="accent1"/>
+          </a:effectRef>
+          <a:fontRef idx="minor">
+            <a:schemeClr val="tx1"/>
+          </a:fontRef>
+        </p:style>
+        <p:txBody>
+          <a:bodyPr rtlCol="0" anchor="ctr"/>
+          <a:lstStyle/>
+          <a:p>
+            <a:pPr algn="ctr"/>
+            <a:endParaRPr lang="en-US"/>
+          </a:p>
+        </p:txBody>
+      </p:sp>
+      <p:sp>
+        <p:nvSpPr>
+          <p:cNvPr id="103" name="Arc 102"/>
+          <p:cNvSpPr/>
+          <p:nvPr/>
+        </p:nvSpPr>
+        <p:spPr>
+          <a:xfrm rot="15150085">
+            <a:off x="2908894" y="2468226"/>
+            <a:ext cx="3514017" cy="1891789"/>
+          </a:xfrm>
+          <a:prstGeom prst="arc">
+            <a:avLst>
+              <a:gd name="adj1" fmla="val 42011"/>
+              <a:gd name="adj2" fmla="val 10761422"/>
+            </a:avLst>
+          </a:prstGeom>
+          <a:ln w="15875">
+            <a:solidFill>
+              <a:schemeClr val="tx1"/>
+            </a:solidFill>
+          </a:ln>
+        </p:spPr>
+        <p:style>
+          <a:lnRef idx="1">
+            <a:schemeClr val="accent1"/>
+          </a:lnRef>
+          <a:fillRef idx="0">
+            <a:schemeClr val="accent1"/>
+          </a:fillRef>
+          <a:effectRef idx="0">
+            <a:schemeClr val="accent1"/>
+          </a:effectRef>
+          <a:fontRef idx="minor">
+            <a:schemeClr val="tx1"/>
+          </a:fontRef>
+        </p:style>
+        <p:txBody>
+          <a:bodyPr rtlCol="0" anchor="ctr"/>
+          <a:lstStyle/>
+          <a:p>
+            <a:pPr algn="ctr"/>
+            <a:endParaRPr lang="en-US"/>
+          </a:p>
+        </p:txBody>
+      </p:sp>
+      <p:cxnSp>
+        <p:nvCxnSpPr>
+          <p:cNvPr id="110" name="Straight Arrow Connector 109"/>
+          <p:cNvCxnSpPr>
+            <a:endCxn id="109" idx="3"/>
+          </p:cNvCxnSpPr>
+          <p:nvPr/>
+        </p:nvCxnSpPr>
+        <p:spPr>
+          <a:xfrm flipV="1">
+            <a:off x="4572000" y="2571400"/>
+            <a:ext cx="714920" cy="852936"/>
+          </a:xfrm>
+          <a:prstGeom prst="straightConnector1">
+            <a:avLst/>
+          </a:prstGeom>
+          <a:ln w="15875">
+            <a:solidFill>
+              <a:schemeClr val="tx1"/>
+            </a:solidFill>
+            <a:tailEnd type="none" w="lg" len="med"/>
+          </a:ln>
+        </p:spPr>
+        <p:style>
+          <a:lnRef idx="1">
+            <a:schemeClr val="accent1"/>
+          </a:lnRef>
+          <a:fillRef idx="0">
+            <a:schemeClr val="accent1"/>
+          </a:fillRef>
+          <a:effectRef idx="0">
+            <a:schemeClr val="accent1"/>
+          </a:effectRef>
+          <a:fontRef idx="minor">
+            <a:schemeClr val="tx1"/>
+          </a:fontRef>
+        </p:style>
+      </p:cxnSp>
+      <p:cxnSp>
+        <p:nvCxnSpPr>
+          <p:cNvPr id="114" name="Straight Arrow Connector 113"/>
+          <p:cNvCxnSpPr/>
+          <p:nvPr/>
+        </p:nvCxnSpPr>
+        <p:spPr>
+          <a:xfrm>
+            <a:off x="4581331" y="3424336"/>
+            <a:ext cx="1110342" cy="513182"/>
+          </a:xfrm>
+          <a:prstGeom prst="straightConnector1">
+            <a:avLst/>
+          </a:prstGeom>
+          <a:ln w="15875">
+            <a:solidFill>
+              <a:schemeClr val="tx1"/>
+            </a:solidFill>
+            <a:prstDash val="dash"/>
+            <a:tailEnd type="none" w="lg" len="med"/>
+          </a:ln>
+        </p:spPr>
+        <p:style>
+          <a:lnRef idx="1">
+            <a:schemeClr val="accent1"/>
+          </a:lnRef>
+          <a:fillRef idx="0">
+            <a:schemeClr val="accent1"/>
+          </a:fillRef>
+          <a:effectRef idx="0">
+            <a:schemeClr val="accent1"/>
+          </a:effectRef>
+          <a:fontRef idx="minor">
+            <a:schemeClr val="tx1"/>
+          </a:fontRef>
+        </p:style>
+      </p:cxnSp>
+      <p:graphicFrame>
+        <p:nvGraphicFramePr>
+          <p:cNvPr id="123" name="Object 122"/>
+          <p:cNvGraphicFramePr>
+            <a:graphicFrameLocks noChangeAspect="1"/>
+          </p:cNvGraphicFramePr>
+          <p:nvPr/>
+        </p:nvGraphicFramePr>
+        <p:xfrm>
+          <a:off x="4425950" y="3673340"/>
+          <a:ext cx="258018" cy="328387"/>
+        </p:xfrm>
+        <a:graphic>
+          <a:graphicData uri="http://schemas.openxmlformats.org/presentationml/2006/ole">
+            <p:oleObj spid="_x0000_s28674" name="Equation" r:id="rId8" imgW="139680" imgH="177480" progId="Equation.DSMT4">
+              <p:embed/>
+            </p:oleObj>
+          </a:graphicData>
+        </a:graphic>
+      </p:graphicFrame>
+      <p:graphicFrame>
+        <p:nvGraphicFramePr>
+          <p:cNvPr id="15381" name="Object 21"/>
+          <p:cNvGraphicFramePr>
+            <a:graphicFrameLocks noChangeAspect="1"/>
+          </p:cNvGraphicFramePr>
+          <p:nvPr/>
+        </p:nvGraphicFramePr>
+        <p:xfrm>
+          <a:off x="4961423" y="3044046"/>
+          <a:ext cx="258763" cy="304800"/>
+        </p:xfrm>
+        <a:graphic>
+          <a:graphicData uri="http://schemas.openxmlformats.org/presentationml/2006/ole">
+            <p:oleObj spid="_x0000_s28675" name="Equation" r:id="rId9" imgW="139680" imgH="164880" progId="Equation.DSMT4">
+              <p:embed/>
+            </p:oleObj>
+          </a:graphicData>
+        </a:graphic>
+      </p:graphicFrame>
+      <p:cxnSp>
+        <p:nvCxnSpPr>
+          <p:cNvPr id="40" name="Straight Arrow Connector 39"/>
+          <p:cNvCxnSpPr/>
+          <p:nvPr/>
+        </p:nvCxnSpPr>
+        <p:spPr>
+          <a:xfrm flipV="1">
+            <a:off x="4581948" y="933062"/>
+            <a:ext cx="8714" cy="2506082"/>
+          </a:xfrm>
+          <a:prstGeom prst="straightConnector1">
+            <a:avLst/>
+          </a:prstGeom>
+          <a:ln w="15875">
+            <a:solidFill>
+              <a:schemeClr val="tx1"/>
+            </a:solidFill>
+            <a:tailEnd type="stealth" w="lg" len="med"/>
+          </a:ln>
+        </p:spPr>
+        <p:style>
+          <a:lnRef idx="1">
+            <a:schemeClr val="accent1"/>
+          </a:lnRef>
+          <a:fillRef idx="0">
+            <a:schemeClr val="accent1"/>
+          </a:fillRef>
+          <a:effectRef idx="0">
+            <a:schemeClr val="accent1"/>
+          </a:effectRef>
+          <a:fontRef idx="minor">
+            <a:schemeClr val="tx1"/>
+          </a:fontRef>
+        </p:style>
+      </p:cxnSp>
+      <p:sp>
+        <p:nvSpPr>
+          <p:cNvPr id="124" name="Arc 123"/>
+          <p:cNvSpPr/>
+          <p:nvPr/>
+        </p:nvSpPr>
+        <p:spPr>
+          <a:xfrm rot="16017324">
+            <a:off x="3390715" y="3304997"/>
+            <a:ext cx="2738910" cy="1408107"/>
+          </a:xfrm>
+          <a:prstGeom prst="arc">
+            <a:avLst>
+              <a:gd name="adj1" fmla="val 1092140"/>
+              <a:gd name="adj2" fmla="val 4601547"/>
+            </a:avLst>
+          </a:prstGeom>
+          <a:ln w="12700">
+            <a:solidFill>
+              <a:schemeClr val="tx1"/>
+            </a:solidFill>
+            <a:headEnd type="stealth"/>
+            <a:tailEnd type="none"/>
+          </a:ln>
+        </p:spPr>
+        <p:style>
+          <a:lnRef idx="1">
+            <a:schemeClr val="accent1"/>
+          </a:lnRef>
+          <a:fillRef idx="0">
+            <a:schemeClr val="accent1"/>
+          </a:fillRef>
+          <a:effectRef idx="0">
+            <a:schemeClr val="accent1"/>
+          </a:effectRef>
+          <a:fontRef idx="minor">
+            <a:schemeClr val="tx1"/>
+          </a:fontRef>
+        </p:style>
+        <p:txBody>
+          <a:bodyPr rtlCol="0" anchor="ctr"/>
+          <a:lstStyle/>
+          <a:p>
+            <a:pPr algn="ctr"/>
+            <a:endParaRPr lang="en-US"/>
+          </a:p>
+        </p:txBody>
+      </p:sp>
+      <p:sp>
+        <p:nvSpPr>
+          <p:cNvPr id="141" name="Arc 140"/>
+          <p:cNvSpPr/>
+          <p:nvPr/>
+        </p:nvSpPr>
+        <p:spPr>
+          <a:xfrm rot="6251086">
+            <a:off x="2843120" y="2477126"/>
+            <a:ext cx="3541615" cy="1931205"/>
+          </a:xfrm>
+          <a:prstGeom prst="arc">
+            <a:avLst>
+              <a:gd name="adj1" fmla="val 19984343"/>
+              <a:gd name="adj2" fmla="val 602459"/>
+            </a:avLst>
+          </a:prstGeom>
+          <a:ln w="15875">
+            <a:solidFill>
+              <a:schemeClr val="tx1"/>
+            </a:solidFill>
+            <a:prstDash val="dash"/>
+          </a:ln>
+        </p:spPr>
+        <p:style>
+          <a:lnRef idx="1">
+            <a:schemeClr val="accent1"/>
+          </a:lnRef>
+          <a:fillRef idx="0">
+            <a:schemeClr val="accent1"/>
+          </a:fillRef>
+          <a:effectRef idx="0">
+            <a:schemeClr val="accent1"/>
+          </a:effectRef>
+          <a:fontRef idx="minor">
+            <a:schemeClr val="tx1"/>
+          </a:fontRef>
+        </p:style>
+        <p:txBody>
+          <a:bodyPr rtlCol="0" anchor="ctr"/>
+          <a:lstStyle/>
+          <a:p>
+            <a:pPr algn="ctr"/>
+            <a:endParaRPr lang="en-US"/>
+          </a:p>
+        </p:txBody>
+      </p:sp>
+      <p:sp>
+        <p:nvSpPr>
+          <p:cNvPr id="146" name="Oval 145"/>
+          <p:cNvSpPr/>
+          <p:nvPr/>
+        </p:nvSpPr>
+        <p:spPr>
+          <a:xfrm>
+            <a:off x="3541278" y="3915995"/>
+            <a:ext cx="90001" cy="90001"/>
+          </a:xfrm>
+          <a:prstGeom prst="ellipse">
+            <a:avLst/>
+          </a:prstGeom>
+          <a:solidFill>
+            <a:schemeClr val="tx1"/>
+          </a:solidFill>
+          <a:ln w="25400">
+            <a:solidFill>
+              <a:schemeClr val="tx1"/>
+            </a:solidFill>
+            <a:tailEnd type="stealth" w="lg" len="med"/>
+          </a:ln>
+        </p:spPr>
+        <p:style>
+          <a:lnRef idx="1">
+            <a:schemeClr val="accent1"/>
+          </a:lnRef>
+          <a:fillRef idx="0">
+            <a:schemeClr val="accent1"/>
+          </a:fillRef>
+          <a:effectRef idx="0">
+            <a:schemeClr val="accent1"/>
+          </a:effectRef>
+          <a:fontRef idx="minor">
+            <a:schemeClr val="tx1"/>
+          </a:fontRef>
+        </p:style>
+        <p:txBody>
+          <a:bodyPr rtlCol="0" anchor="ctr"/>
+          <a:lstStyle/>
+          <a:p>
+            <a:pPr algn="ctr"/>
+            <a:endParaRPr lang="en-US"/>
+          </a:p>
+        </p:txBody>
+      </p:sp>
+      <p:sp>
+        <p:nvSpPr>
+          <p:cNvPr id="147" name="Oval 146"/>
+          <p:cNvSpPr/>
+          <p:nvPr/>
+        </p:nvSpPr>
+        <p:spPr>
+          <a:xfrm>
+            <a:off x="4542764" y="1745072"/>
+            <a:ext cx="90001" cy="90001"/>
+          </a:xfrm>
+          <a:prstGeom prst="ellipse">
+            <a:avLst/>
+          </a:prstGeom>
+          <a:solidFill>
+            <a:schemeClr val="tx1"/>
+          </a:solidFill>
+          <a:ln w="25400">
+            <a:solidFill>
+              <a:schemeClr val="tx1"/>
+            </a:solidFill>
+            <a:tailEnd type="stealth" w="lg" len="med"/>
+          </a:ln>
+        </p:spPr>
+        <p:style>
+          <a:lnRef idx="1">
+            <a:schemeClr val="accent1"/>
+          </a:lnRef>
+          <a:fillRef idx="0">
+            <a:schemeClr val="accent1"/>
+          </a:fillRef>
+          <a:effectRef idx="0">
+            <a:schemeClr val="accent1"/>
+          </a:effectRef>
+          <a:fontRef idx="minor">
+            <a:schemeClr val="tx1"/>
+          </a:fontRef>
+        </p:style>
+        <p:txBody>
+          <a:bodyPr rtlCol="0" anchor="ctr"/>
+          <a:lstStyle/>
+          <a:p>
+            <a:pPr algn="ctr"/>
+            <a:endParaRPr lang="en-US"/>
+          </a:p>
+        </p:txBody>
+      </p:sp>
+      <p:sp>
+        <p:nvSpPr>
+          <p:cNvPr id="148" name="Oval 147"/>
+          <p:cNvSpPr/>
+          <p:nvPr/>
+        </p:nvSpPr>
+        <p:spPr>
+          <a:xfrm>
+            <a:off x="5867804" y="1763643"/>
+            <a:ext cx="90001" cy="90001"/>
+          </a:xfrm>
+          <a:prstGeom prst="ellipse">
+            <a:avLst/>
+          </a:prstGeom>
+          <a:solidFill>
+            <a:schemeClr val="tx1"/>
+          </a:solidFill>
+          <a:ln w="25400">
+            <a:solidFill>
+              <a:schemeClr val="tx1"/>
+            </a:solidFill>
+            <a:tailEnd type="stealth" w="lg" len="med"/>
+          </a:ln>
+        </p:spPr>
+        <p:style>
+          <a:lnRef idx="1">
+            <a:schemeClr val="accent1"/>
+          </a:lnRef>
+          <a:fillRef idx="0">
+            <a:schemeClr val="accent1"/>
+          </a:fillRef>
+          <a:effectRef idx="0">
+            <a:schemeClr val="accent1"/>
+          </a:effectRef>
+          <a:fontRef idx="minor">
+            <a:schemeClr val="tx1"/>
+          </a:fontRef>
+        </p:style>
+        <p:txBody>
+          <a:bodyPr rtlCol="0" anchor="ctr"/>
+          <a:lstStyle/>
+          <a:p>
+            <a:pPr algn="ctr"/>
+            <a:endParaRPr lang="en-US"/>
+          </a:p>
+        </p:txBody>
+      </p:sp>
+      <p:cxnSp>
+        <p:nvCxnSpPr>
+          <p:cNvPr id="151" name="Straight Arrow Connector 150"/>
+          <p:cNvCxnSpPr>
+            <a:stCxn id="109" idx="7"/>
+            <a:endCxn id="148" idx="3"/>
+          </p:cNvCxnSpPr>
+          <p:nvPr/>
+        </p:nvCxnSpPr>
+        <p:spPr>
+          <a:xfrm flipV="1">
+            <a:off x="5350561" y="1840464"/>
+            <a:ext cx="530423" cy="667295"/>
+          </a:xfrm>
+          <a:prstGeom prst="straightConnector1">
+            <a:avLst/>
+          </a:prstGeom>
+          <a:ln w="15875">
+            <a:solidFill>
+              <a:schemeClr val="tx1"/>
+            </a:solidFill>
+            <a:headEnd type="stealth"/>
+            <a:tailEnd type="stealth" w="lg" len="med"/>
+          </a:ln>
+        </p:spPr>
+        <p:style>
+          <a:lnRef idx="1">
+            <a:schemeClr val="accent1"/>
+          </a:lnRef>
+          <a:fillRef idx="0">
+            <a:schemeClr val="accent1"/>
+          </a:fillRef>
+          <a:effectRef idx="0">
+            <a:schemeClr val="accent1"/>
+          </a:effectRef>
+          <a:fontRef idx="minor">
+            <a:schemeClr val="tx1"/>
+          </a:fontRef>
+        </p:style>
+      </p:cxnSp>
+      <p:graphicFrame>
+        <p:nvGraphicFramePr>
+          <p:cNvPr id="15387" name="Object 27"/>
+          <p:cNvGraphicFramePr>
+            <a:graphicFrameLocks noChangeAspect="1"/>
+          </p:cNvGraphicFramePr>
+          <p:nvPr/>
+        </p:nvGraphicFramePr>
+        <p:xfrm>
+          <a:off x="5335267" y="1981522"/>
+          <a:ext cx="236538" cy="327025"/>
+        </p:xfrm>
+        <a:graphic>
+          <a:graphicData uri="http://schemas.openxmlformats.org/presentationml/2006/ole">
+            <p:oleObj spid="_x0000_s28681" name="Equation" r:id="rId10" imgW="126720" imgH="177480" progId="Equation.DSMT4">
+              <p:embed/>
+            </p:oleObj>
+          </a:graphicData>
+        </a:graphic>
+      </p:graphicFrame>
+      <p:sp>
+        <p:nvSpPr>
+          <p:cNvPr id="158" name="TextBox 157"/>
+          <p:cNvSpPr txBox="1"/>
+          <p:nvPr/>
+        </p:nvSpPr>
+        <p:spPr>
+          <a:xfrm>
+            <a:off x="6204857" y="2136709"/>
+            <a:ext cx="1306286" cy="523220"/>
+          </a:xfrm>
+          <a:prstGeom prst="rect">
+            <a:avLst/>
+          </a:prstGeom>
+          <a:noFill/>
+        </p:spPr>
+        <p:txBody>
+          <a:bodyPr wrap="square" rtlCol="0">
+            <a:spAutoFit/>
+          </a:bodyPr>
+          <a:lstStyle/>
+          <a:p>
+            <a:r>
+              <a:rPr lang="en-US" sz="1400" dirty="0" smtClean="0">
+                <a:latin typeface="Garamond" pitchFamily="18" charset="0"/>
+              </a:rPr>
+              <a:t>Local tangent plane</a:t>
+            </a:r>
+            <a:endParaRPr lang="en-US" sz="1400" dirty="0">
+              <a:latin typeface="Garamond" pitchFamily="18" charset="0"/>
+            </a:endParaRPr>
+          </a:p>
+        </p:txBody>
+      </p:sp>
+      <p:cxnSp>
+        <p:nvCxnSpPr>
+          <p:cNvPr id="159" name="Straight Arrow Connector 158"/>
+          <p:cNvCxnSpPr>
+            <a:stCxn id="158" idx="1"/>
+          </p:cNvCxnSpPr>
+          <p:nvPr/>
+        </p:nvCxnSpPr>
+        <p:spPr>
+          <a:xfrm flipH="1">
+            <a:off x="5514393" y="2398319"/>
+            <a:ext cx="690464" cy="204922"/>
+          </a:xfrm>
+          <a:prstGeom prst="straightConnector1">
+            <a:avLst/>
+          </a:prstGeom>
+          <a:ln w="15875">
+            <a:solidFill>
+              <a:schemeClr val="tx1"/>
+            </a:solidFill>
+            <a:tailEnd type="stealth" w="lg" len="med"/>
+          </a:ln>
+        </p:spPr>
+        <p:style>
+          <a:lnRef idx="1">
+            <a:schemeClr val="accent1"/>
+          </a:lnRef>
+          <a:fillRef idx="0">
+            <a:schemeClr val="accent1"/>
+          </a:fillRef>
+          <a:effectRef idx="0">
+            <a:schemeClr val="accent1"/>
+          </a:effectRef>
+          <a:fontRef idx="minor">
+            <a:schemeClr val="tx1"/>
+          </a:fontRef>
+        </p:style>
+      </p:cxnSp>
+      <p:cxnSp>
+        <p:nvCxnSpPr>
+          <p:cNvPr id="36" name="Straight Arrow Connector 35"/>
+          <p:cNvCxnSpPr/>
+          <p:nvPr/>
+        </p:nvCxnSpPr>
+        <p:spPr>
+          <a:xfrm flipH="1">
+            <a:off x="1952626" y="3431717"/>
+            <a:ext cx="2617040" cy="625933"/>
+          </a:xfrm>
+          <a:prstGeom prst="straightConnector1">
+            <a:avLst/>
+          </a:prstGeom>
+          <a:ln w="15875">
+            <a:solidFill>
+              <a:schemeClr val="tx1"/>
+            </a:solidFill>
+            <a:tailEnd type="stealth" w="lg" len="med"/>
+          </a:ln>
+        </p:spPr>
+        <p:style>
+          <a:lnRef idx="1">
+            <a:schemeClr val="accent1"/>
+          </a:lnRef>
+          <a:fillRef idx="0">
+            <a:schemeClr val="accent1"/>
+          </a:fillRef>
+          <a:effectRef idx="0">
+            <a:schemeClr val="accent1"/>
+          </a:effectRef>
+          <a:fontRef idx="minor">
+            <a:schemeClr val="tx1"/>
+          </a:fontRef>
+        </p:style>
+      </p:cxnSp>
+      <p:graphicFrame>
+        <p:nvGraphicFramePr>
+          <p:cNvPr id="28682" name="Object 23"/>
+          <p:cNvGraphicFramePr>
+            <a:graphicFrameLocks noChangeAspect="1"/>
+          </p:cNvGraphicFramePr>
+          <p:nvPr/>
+        </p:nvGraphicFramePr>
+        <p:xfrm>
+          <a:off x="1717675" y="3616325"/>
+          <a:ext cx="282575" cy="422275"/>
+        </p:xfrm>
+        <a:graphic>
+          <a:graphicData uri="http://schemas.openxmlformats.org/presentationml/2006/ole">
+            <p:oleObj spid="_x0000_s28682" name="Equation" r:id="rId11" imgW="152280" imgH="228600" progId="Equation.DSMT4">
+              <p:embed/>
+            </p:oleObj>
+          </a:graphicData>
+        </a:graphic>
+      </p:graphicFrame>
+      <p:sp>
+        <p:nvSpPr>
+          <p:cNvPr id="47" name="TextBox 46"/>
+          <p:cNvSpPr txBox="1"/>
+          <p:nvPr/>
+        </p:nvSpPr>
+        <p:spPr>
+          <a:xfrm>
+            <a:off x="1551991" y="4092058"/>
+            <a:ext cx="961053" cy="523220"/>
+          </a:xfrm>
+          <a:prstGeom prst="rect">
+            <a:avLst/>
+          </a:prstGeom>
+          <a:noFill/>
+        </p:spPr>
+        <p:txBody>
+          <a:bodyPr wrap="square" rtlCol="0">
+            <a:spAutoFit/>
+          </a:bodyPr>
+          <a:lstStyle/>
+          <a:p>
+            <a:r>
+              <a:rPr lang="en-US" sz="1400" dirty="0" smtClean="0">
+                <a:latin typeface="Garamond" pitchFamily="18" charset="0"/>
+              </a:rPr>
+              <a:t>Celestial reference</a:t>
+            </a:r>
+            <a:endParaRPr lang="en-US" sz="1400" dirty="0">
+              <a:latin typeface="Garamond" pitchFamily="18" charset="0"/>
+            </a:endParaRPr>
+          </a:p>
+        </p:txBody>
+      </p:sp>
+      <p:cxnSp>
+        <p:nvCxnSpPr>
+          <p:cNvPr id="48" name="Straight Arrow Connector 47"/>
+          <p:cNvCxnSpPr>
+            <a:stCxn id="66" idx="1"/>
+          </p:cNvCxnSpPr>
+          <p:nvPr/>
+        </p:nvCxnSpPr>
+        <p:spPr>
+          <a:xfrm>
+            <a:off x="4588182" y="3428997"/>
+            <a:ext cx="907743" cy="904878"/>
+          </a:xfrm>
+          <a:prstGeom prst="straightConnector1">
+            <a:avLst/>
+          </a:prstGeom>
+          <a:ln w="15875">
+            <a:solidFill>
+              <a:schemeClr val="tx1"/>
+            </a:solidFill>
+            <a:tailEnd type="stealth" w="lg" len="med"/>
+          </a:ln>
+        </p:spPr>
+        <p:style>
+          <a:lnRef idx="1">
+            <a:schemeClr val="accent1"/>
+          </a:lnRef>
+          <a:fillRef idx="0">
+            <a:schemeClr val="accent1"/>
+          </a:fillRef>
+          <a:effectRef idx="0">
+            <a:schemeClr val="accent1"/>
+          </a:effectRef>
+          <a:fontRef idx="minor">
+            <a:schemeClr val="tx1"/>
+          </a:fontRef>
+        </p:style>
+      </p:cxnSp>
+      <p:graphicFrame>
+        <p:nvGraphicFramePr>
+          <p:cNvPr id="28683" name="Object 23"/>
+          <p:cNvGraphicFramePr>
+            <a:graphicFrameLocks noChangeAspect="1"/>
+          </p:cNvGraphicFramePr>
+          <p:nvPr/>
+        </p:nvGraphicFramePr>
+        <p:xfrm>
+          <a:off x="5146675" y="4083050"/>
+          <a:ext cx="282575" cy="422275"/>
+        </p:xfrm>
+        <a:graphic>
+          <a:graphicData uri="http://schemas.openxmlformats.org/presentationml/2006/ole">
+            <p:oleObj spid="_x0000_s28683" name="Equation" r:id="rId12" imgW="152280" imgH="228600" progId="Equation.DSMT4">
+              <p:embed/>
+            </p:oleObj>
+          </a:graphicData>
+        </a:graphic>
+      </p:graphicFrame>
     </p:spTree>
   </p:cSld>
   <p:clrMapOvr>

</xml_diff>

<commit_message>
Figures numbering is update to match the paper
</commit_message>
<xml_diff>
--- a/Springer_UAV_book/Pictures/Fig3.pptx
+++ b/Springer_UAV_book/Pictures/Fig3.pptx
@@ -5,8 +5,7 @@
     <p:sldMasterId id="2147483648" r:id="rId1"/>
   </p:sldMasterIdLst>
   <p:sldIdLst>
-    <p:sldId id="261" r:id="rId2"/>
-    <p:sldId id="262" r:id="rId3"/>
+    <p:sldId id="257" r:id="rId2"/>
   </p:sldIdLst>
   <p:sldSz cx="9144000" cy="6858000" type="screen4x3"/>
   <p:notesSz cx="6858000" cy="9144000"/>
@@ -287,10 +286,9 @@
           <a:bodyPr/>
           <a:lstStyle/>
           <a:p>
-            <a:fld id="{1D8BD707-D9CF-40AE-B4C6-C98DA3205C09}" type="datetimeFigureOut">
-              <a:rPr lang="en-US" smtClean="0"/>
-              <a:pPr/>
-              <a:t>8/9/2012</a:t>
+            <a:fld id="{CC7BA875-E63D-46CD-9D74-6CBD955FEC8C}" type="datetimeFigureOut">
+              <a:rPr lang="en-US" smtClean="0"/>
+              <a:t>4/12/2012</a:t>
             </a:fld>
             <a:endParaRPr lang="en-US"/>
           </a:p>
@@ -330,9 +328,8 @@
           <a:bodyPr/>
           <a:lstStyle/>
           <a:p>
-            <a:fld id="{B6F15528-21DE-4FAA-801E-634DDDAF4B2B}" type="slidenum">
-              <a:rPr lang="en-US" smtClean="0"/>
-              <a:pPr/>
+            <a:fld id="{11B0B683-BC1F-4E65-9452-2D9CAA3E1FA5}" type="slidenum">
+              <a:rPr lang="en-US" smtClean="0"/>
               <a:t>‹#›</a:t>
             </a:fld>
             <a:endParaRPr lang="en-US"/>
@@ -454,10 +451,9 @@
           <a:bodyPr/>
           <a:lstStyle/>
           <a:p>
-            <a:fld id="{1D8BD707-D9CF-40AE-B4C6-C98DA3205C09}" type="datetimeFigureOut">
-              <a:rPr lang="en-US" smtClean="0"/>
-              <a:pPr/>
-              <a:t>8/9/2012</a:t>
+            <a:fld id="{CC7BA875-E63D-46CD-9D74-6CBD955FEC8C}" type="datetimeFigureOut">
+              <a:rPr lang="en-US" smtClean="0"/>
+              <a:t>4/12/2012</a:t>
             </a:fld>
             <a:endParaRPr lang="en-US"/>
           </a:p>
@@ -497,9 +493,8 @@
           <a:bodyPr/>
           <a:lstStyle/>
           <a:p>
-            <a:fld id="{B6F15528-21DE-4FAA-801E-634DDDAF4B2B}" type="slidenum">
-              <a:rPr lang="en-US" smtClean="0"/>
-              <a:pPr/>
+            <a:fld id="{11B0B683-BC1F-4E65-9452-2D9CAA3E1FA5}" type="slidenum">
+              <a:rPr lang="en-US" smtClean="0"/>
               <a:t>‹#›</a:t>
             </a:fld>
             <a:endParaRPr lang="en-US"/>
@@ -631,10 +626,9 @@
           <a:bodyPr/>
           <a:lstStyle/>
           <a:p>
-            <a:fld id="{1D8BD707-D9CF-40AE-B4C6-C98DA3205C09}" type="datetimeFigureOut">
-              <a:rPr lang="en-US" smtClean="0"/>
-              <a:pPr/>
-              <a:t>8/9/2012</a:t>
+            <a:fld id="{CC7BA875-E63D-46CD-9D74-6CBD955FEC8C}" type="datetimeFigureOut">
+              <a:rPr lang="en-US" smtClean="0"/>
+              <a:t>4/12/2012</a:t>
             </a:fld>
             <a:endParaRPr lang="en-US"/>
           </a:p>
@@ -674,9 +668,8 @@
           <a:bodyPr/>
           <a:lstStyle/>
           <a:p>
-            <a:fld id="{B6F15528-21DE-4FAA-801E-634DDDAF4B2B}" type="slidenum">
-              <a:rPr lang="en-US" smtClean="0"/>
-              <a:pPr/>
+            <a:fld id="{11B0B683-BC1F-4E65-9452-2D9CAA3E1FA5}" type="slidenum">
+              <a:rPr lang="en-US" smtClean="0"/>
               <a:t>‹#›</a:t>
             </a:fld>
             <a:endParaRPr lang="en-US"/>
@@ -798,10 +791,9 @@
           <a:bodyPr/>
           <a:lstStyle/>
           <a:p>
-            <a:fld id="{1D8BD707-D9CF-40AE-B4C6-C98DA3205C09}" type="datetimeFigureOut">
-              <a:rPr lang="en-US" smtClean="0"/>
-              <a:pPr/>
-              <a:t>8/9/2012</a:t>
+            <a:fld id="{CC7BA875-E63D-46CD-9D74-6CBD955FEC8C}" type="datetimeFigureOut">
+              <a:rPr lang="en-US" smtClean="0"/>
+              <a:t>4/12/2012</a:t>
             </a:fld>
             <a:endParaRPr lang="en-US"/>
           </a:p>
@@ -841,9 +833,8 @@
           <a:bodyPr/>
           <a:lstStyle/>
           <a:p>
-            <a:fld id="{B6F15528-21DE-4FAA-801E-634DDDAF4B2B}" type="slidenum">
-              <a:rPr lang="en-US" smtClean="0"/>
-              <a:pPr/>
+            <a:fld id="{11B0B683-BC1F-4E65-9452-2D9CAA3E1FA5}" type="slidenum">
+              <a:rPr lang="en-US" smtClean="0"/>
               <a:t>‹#›</a:t>
             </a:fld>
             <a:endParaRPr lang="en-US"/>
@@ -1041,10 +1032,9 @@
           <a:bodyPr/>
           <a:lstStyle/>
           <a:p>
-            <a:fld id="{1D8BD707-D9CF-40AE-B4C6-C98DA3205C09}" type="datetimeFigureOut">
-              <a:rPr lang="en-US" smtClean="0"/>
-              <a:pPr/>
-              <a:t>8/9/2012</a:t>
+            <a:fld id="{CC7BA875-E63D-46CD-9D74-6CBD955FEC8C}" type="datetimeFigureOut">
+              <a:rPr lang="en-US" smtClean="0"/>
+              <a:t>4/12/2012</a:t>
             </a:fld>
             <a:endParaRPr lang="en-US"/>
           </a:p>
@@ -1084,9 +1074,8 @@
           <a:bodyPr/>
           <a:lstStyle/>
           <a:p>
-            <a:fld id="{B6F15528-21DE-4FAA-801E-634DDDAF4B2B}" type="slidenum">
-              <a:rPr lang="en-US" smtClean="0"/>
-              <a:pPr/>
+            <a:fld id="{11B0B683-BC1F-4E65-9452-2D9CAA3E1FA5}" type="slidenum">
+              <a:rPr lang="en-US" smtClean="0"/>
               <a:t>‹#›</a:t>
             </a:fld>
             <a:endParaRPr lang="en-US"/>
@@ -1326,10 +1315,9 @@
           <a:bodyPr/>
           <a:lstStyle/>
           <a:p>
-            <a:fld id="{1D8BD707-D9CF-40AE-B4C6-C98DA3205C09}" type="datetimeFigureOut">
-              <a:rPr lang="en-US" smtClean="0"/>
-              <a:pPr/>
-              <a:t>8/9/2012</a:t>
+            <a:fld id="{CC7BA875-E63D-46CD-9D74-6CBD955FEC8C}" type="datetimeFigureOut">
+              <a:rPr lang="en-US" smtClean="0"/>
+              <a:t>4/12/2012</a:t>
             </a:fld>
             <a:endParaRPr lang="en-US"/>
           </a:p>
@@ -1369,9 +1357,8 @@
           <a:bodyPr/>
           <a:lstStyle/>
           <a:p>
-            <a:fld id="{B6F15528-21DE-4FAA-801E-634DDDAF4B2B}" type="slidenum">
-              <a:rPr lang="en-US" smtClean="0"/>
-              <a:pPr/>
+            <a:fld id="{11B0B683-BC1F-4E65-9452-2D9CAA3E1FA5}" type="slidenum">
+              <a:rPr lang="en-US" smtClean="0"/>
               <a:t>‹#›</a:t>
             </a:fld>
             <a:endParaRPr lang="en-US"/>
@@ -1745,10 +1732,9 @@
           <a:bodyPr/>
           <a:lstStyle/>
           <a:p>
-            <a:fld id="{1D8BD707-D9CF-40AE-B4C6-C98DA3205C09}" type="datetimeFigureOut">
-              <a:rPr lang="en-US" smtClean="0"/>
-              <a:pPr/>
-              <a:t>8/9/2012</a:t>
+            <a:fld id="{CC7BA875-E63D-46CD-9D74-6CBD955FEC8C}" type="datetimeFigureOut">
+              <a:rPr lang="en-US" smtClean="0"/>
+              <a:t>4/12/2012</a:t>
             </a:fld>
             <a:endParaRPr lang="en-US"/>
           </a:p>
@@ -1788,9 +1774,8 @@
           <a:bodyPr/>
           <a:lstStyle/>
           <a:p>
-            <a:fld id="{B6F15528-21DE-4FAA-801E-634DDDAF4B2B}" type="slidenum">
-              <a:rPr lang="en-US" smtClean="0"/>
-              <a:pPr/>
+            <a:fld id="{11B0B683-BC1F-4E65-9452-2D9CAA3E1FA5}" type="slidenum">
+              <a:rPr lang="en-US" smtClean="0"/>
               <a:t>‹#›</a:t>
             </a:fld>
             <a:endParaRPr lang="en-US"/>
@@ -1860,10 +1845,9 @@
           <a:bodyPr/>
           <a:lstStyle/>
           <a:p>
-            <a:fld id="{1D8BD707-D9CF-40AE-B4C6-C98DA3205C09}" type="datetimeFigureOut">
-              <a:rPr lang="en-US" smtClean="0"/>
-              <a:pPr/>
-              <a:t>8/9/2012</a:t>
+            <a:fld id="{CC7BA875-E63D-46CD-9D74-6CBD955FEC8C}" type="datetimeFigureOut">
+              <a:rPr lang="en-US" smtClean="0"/>
+              <a:t>4/12/2012</a:t>
             </a:fld>
             <a:endParaRPr lang="en-US"/>
           </a:p>
@@ -1903,9 +1887,8 @@
           <a:bodyPr/>
           <a:lstStyle/>
           <a:p>
-            <a:fld id="{B6F15528-21DE-4FAA-801E-634DDDAF4B2B}" type="slidenum">
-              <a:rPr lang="en-US" smtClean="0"/>
-              <a:pPr/>
+            <a:fld id="{11B0B683-BC1F-4E65-9452-2D9CAA3E1FA5}" type="slidenum">
+              <a:rPr lang="en-US" smtClean="0"/>
               <a:t>‹#›</a:t>
             </a:fld>
             <a:endParaRPr lang="en-US"/>
@@ -1952,10 +1935,9 @@
           <a:bodyPr/>
           <a:lstStyle/>
           <a:p>
-            <a:fld id="{1D8BD707-D9CF-40AE-B4C6-C98DA3205C09}" type="datetimeFigureOut">
-              <a:rPr lang="en-US" smtClean="0"/>
-              <a:pPr/>
-              <a:t>8/9/2012</a:t>
+            <a:fld id="{CC7BA875-E63D-46CD-9D74-6CBD955FEC8C}" type="datetimeFigureOut">
+              <a:rPr lang="en-US" smtClean="0"/>
+              <a:t>4/12/2012</a:t>
             </a:fld>
             <a:endParaRPr lang="en-US"/>
           </a:p>
@@ -1995,9 +1977,8 @@
           <a:bodyPr/>
           <a:lstStyle/>
           <a:p>
-            <a:fld id="{B6F15528-21DE-4FAA-801E-634DDDAF4B2B}" type="slidenum">
-              <a:rPr lang="en-US" smtClean="0"/>
-              <a:pPr/>
+            <a:fld id="{11B0B683-BC1F-4E65-9452-2D9CAA3E1FA5}" type="slidenum">
+              <a:rPr lang="en-US" smtClean="0"/>
               <a:t>‹#›</a:t>
             </a:fld>
             <a:endParaRPr lang="en-US"/>
@@ -2226,10 +2207,9 @@
           <a:bodyPr/>
           <a:lstStyle/>
           <a:p>
-            <a:fld id="{1D8BD707-D9CF-40AE-B4C6-C98DA3205C09}" type="datetimeFigureOut">
-              <a:rPr lang="en-US" smtClean="0"/>
-              <a:pPr/>
-              <a:t>8/9/2012</a:t>
+            <a:fld id="{CC7BA875-E63D-46CD-9D74-6CBD955FEC8C}" type="datetimeFigureOut">
+              <a:rPr lang="en-US" smtClean="0"/>
+              <a:t>4/12/2012</a:t>
             </a:fld>
             <a:endParaRPr lang="en-US"/>
           </a:p>
@@ -2269,9 +2249,8 @@
           <a:bodyPr/>
           <a:lstStyle/>
           <a:p>
-            <a:fld id="{B6F15528-21DE-4FAA-801E-634DDDAF4B2B}" type="slidenum">
-              <a:rPr lang="en-US" smtClean="0"/>
-              <a:pPr/>
+            <a:fld id="{11B0B683-BC1F-4E65-9452-2D9CAA3E1FA5}" type="slidenum">
+              <a:rPr lang="en-US" smtClean="0"/>
               <a:t>‹#›</a:t>
             </a:fld>
             <a:endParaRPr lang="en-US"/>
@@ -2476,10 +2455,9 @@
           <a:bodyPr/>
           <a:lstStyle/>
           <a:p>
-            <a:fld id="{1D8BD707-D9CF-40AE-B4C6-C98DA3205C09}" type="datetimeFigureOut">
-              <a:rPr lang="en-US" smtClean="0"/>
-              <a:pPr/>
-              <a:t>8/9/2012</a:t>
+            <a:fld id="{CC7BA875-E63D-46CD-9D74-6CBD955FEC8C}" type="datetimeFigureOut">
+              <a:rPr lang="en-US" smtClean="0"/>
+              <a:t>4/12/2012</a:t>
             </a:fld>
             <a:endParaRPr lang="en-US"/>
           </a:p>
@@ -2519,9 +2497,8 @@
           <a:bodyPr/>
           <a:lstStyle/>
           <a:p>
-            <a:fld id="{B6F15528-21DE-4FAA-801E-634DDDAF4B2B}" type="slidenum">
-              <a:rPr lang="en-US" smtClean="0"/>
-              <a:pPr/>
+            <a:fld id="{11B0B683-BC1F-4E65-9452-2D9CAA3E1FA5}" type="slidenum">
+              <a:rPr lang="en-US" smtClean="0"/>
               <a:t>‹#›</a:t>
             </a:fld>
             <a:endParaRPr lang="en-US"/>
@@ -2686,10 +2663,9 @@
             </a:lvl1pPr>
           </a:lstStyle>
           <a:p>
-            <a:fld id="{1D8BD707-D9CF-40AE-B4C6-C98DA3205C09}" type="datetimeFigureOut">
-              <a:rPr lang="en-US" smtClean="0"/>
-              <a:pPr/>
-              <a:t>8/9/2012</a:t>
+            <a:fld id="{CC7BA875-E63D-46CD-9D74-6CBD955FEC8C}" type="datetimeFigureOut">
+              <a:rPr lang="en-US" smtClean="0"/>
+              <a:t>4/12/2012</a:t>
             </a:fld>
             <a:endParaRPr lang="en-US"/>
           </a:p>
@@ -2765,9 +2741,8 @@
             </a:lvl1pPr>
           </a:lstStyle>
           <a:p>
-            <a:fld id="{B6F15528-21DE-4FAA-801E-634DDDAF4B2B}" type="slidenum">
-              <a:rPr lang="en-US" smtClean="0"/>
-              <a:pPr/>
+            <a:fld id="{11B0B683-BC1F-4E65-9452-2D9CAA3E1FA5}" type="slidenum">
+              <a:rPr lang="en-US" smtClean="0"/>
               <a:t>‹#›</a:t>
             </a:fld>
             <a:endParaRPr lang="en-US"/>
@@ -3062,226 +3037,118 @@
       </p:grpSpPr>
       <p:sp>
         <p:nvSpPr>
-          <p:cNvPr id="157" name="Rectangle 156"/>
-          <p:cNvSpPr/>
+          <p:cNvPr id="5" name="Oval 42"/>
+          <p:cNvSpPr>
+            <a:spLocks noChangeArrowheads="1"/>
+          </p:cNvSpPr>
           <p:nvPr/>
         </p:nvSpPr>
-        <p:spPr>
-          <a:xfrm rot="3418305">
-            <a:off x="5147555" y="2412717"/>
-            <a:ext cx="345383" cy="283109"/>
-          </a:xfrm>
-          <a:prstGeom prst="rect">
-            <a:avLst/>
-          </a:prstGeom>
-          <a:solidFill>
-            <a:schemeClr val="bg1">
-              <a:lumMod val="85000"/>
-              <a:alpha val="80000"/>
-            </a:schemeClr>
-          </a:solidFill>
-          <a:ln w="12700">
-            <a:solidFill>
-              <a:schemeClr val="tx1"/>
-            </a:solidFill>
-            <a:headEnd type="stealth"/>
-            <a:tailEnd type="none"/>
-          </a:ln>
-        </p:spPr>
-        <p:style>
-          <a:lnRef idx="1">
-            <a:schemeClr val="accent1"/>
-          </a:lnRef>
-          <a:fillRef idx="0">
-            <a:schemeClr val="accent1"/>
-          </a:fillRef>
-          <a:effectRef idx="0">
-            <a:schemeClr val="accent1"/>
-          </a:effectRef>
-          <a:fontRef idx="minor">
-            <a:schemeClr val="tx1"/>
-          </a:fontRef>
-        </p:style>
-        <p:txBody>
-          <a:bodyPr rtlCol="0" anchor="ctr"/>
-          <a:lstStyle/>
-          <a:p>
-            <a:pPr algn="ctr"/>
-            <a:endParaRPr lang="en-US">
-              <a:solidFill>
-                <a:schemeClr val="tx1"/>
-              </a:solidFill>
-            </a:endParaRPr>
-          </a:p>
-        </p:txBody>
-      </p:sp>
-      <p:sp>
-        <p:nvSpPr>
-          <p:cNvPr id="66" name="Arc 65"/>
-          <p:cNvSpPr/>
-          <p:nvPr/>
-        </p:nvSpPr>
-        <p:spPr>
-          <a:xfrm>
-            <a:off x="2827175" y="2771186"/>
-            <a:ext cx="3522013" cy="1315622"/>
-          </a:xfrm>
-          <a:prstGeom prst="arc">
-            <a:avLst>
-              <a:gd name="adj1" fmla="val 11486"/>
-              <a:gd name="adj2" fmla="val 10808031"/>
-            </a:avLst>
-          </a:prstGeom>
-          <a:solidFill>
-            <a:schemeClr val="bg1">
-              <a:lumMod val="85000"/>
-              <a:alpha val="49000"/>
-            </a:schemeClr>
-          </a:solidFill>
-          <a:ln w="19050">
-            <a:solidFill>
-              <a:schemeClr val="tx1"/>
-            </a:solidFill>
-          </a:ln>
-        </p:spPr>
-        <p:style>
-          <a:lnRef idx="1">
-            <a:schemeClr val="accent1"/>
-          </a:lnRef>
-          <a:fillRef idx="0">
-            <a:schemeClr val="accent1"/>
-          </a:fillRef>
-          <a:effectRef idx="0">
-            <a:schemeClr val="accent1"/>
-          </a:effectRef>
-          <a:fontRef idx="minor">
-            <a:schemeClr val="tx1"/>
-          </a:fontRef>
-        </p:style>
-        <p:txBody>
-          <a:bodyPr rtlCol="0" anchor="ctr"/>
-          <a:lstStyle/>
-          <a:p>
-            <a:pPr algn="ctr"/>
-            <a:endParaRPr lang="en-US"/>
-          </a:p>
-        </p:txBody>
-      </p:sp>
-      <p:sp>
-        <p:nvSpPr>
-          <p:cNvPr id="137" name="Arc 136"/>
-          <p:cNvSpPr/>
-          <p:nvPr/>
-        </p:nvSpPr>
-        <p:spPr>
-          <a:xfrm rot="10800000">
-            <a:off x="2820565" y="2792958"/>
-            <a:ext cx="3536302" cy="1315619"/>
-          </a:xfrm>
-          <a:prstGeom prst="arc">
-            <a:avLst>
-              <a:gd name="adj1" fmla="val 11355"/>
-              <a:gd name="adj2" fmla="val 10808031"/>
-            </a:avLst>
-          </a:prstGeom>
-          <a:solidFill>
-            <a:schemeClr val="bg1">
-              <a:lumMod val="85000"/>
-              <a:alpha val="49000"/>
-            </a:schemeClr>
-          </a:solidFill>
-          <a:ln w="19050">
-            <a:solidFill>
-              <a:schemeClr val="tx1"/>
-            </a:solidFill>
-            <a:prstDash val="dash"/>
-          </a:ln>
-        </p:spPr>
-        <p:style>
-          <a:lnRef idx="1">
-            <a:schemeClr val="accent1"/>
-          </a:lnRef>
-          <a:fillRef idx="0">
-            <a:schemeClr val="accent1"/>
-          </a:fillRef>
-          <a:effectRef idx="0">
-            <a:schemeClr val="accent1"/>
-          </a:effectRef>
-          <a:fontRef idx="minor">
-            <a:schemeClr val="tx1"/>
-          </a:fontRef>
-        </p:style>
-        <p:txBody>
-          <a:bodyPr rtlCol="0" anchor="ctr"/>
-          <a:lstStyle/>
-          <a:p>
-            <a:pPr algn="ctr"/>
-            <a:endParaRPr lang="en-US"/>
-          </a:p>
-        </p:txBody>
-      </p:sp>
-      <p:sp>
-        <p:nvSpPr>
-          <p:cNvPr id="43" name="Oval 42"/>
-          <p:cNvSpPr/>
-          <p:nvPr/>
-        </p:nvSpPr>
-        <p:spPr>
-          <a:xfrm>
-            <a:off x="2813374" y="1670374"/>
-            <a:ext cx="3536302" cy="3536302"/>
+        <p:spPr bwMode="auto">
+          <a:xfrm rot="2567684">
+            <a:off x="3908315" y="2113024"/>
+            <a:ext cx="850900" cy="2144718"/>
           </a:xfrm>
           <a:prstGeom prst="ellipse">
             <a:avLst/>
           </a:prstGeom>
+          <a:gradFill flip="none" rotWithShape="1">
+            <a:gsLst>
+              <a:gs pos="0">
+                <a:schemeClr val="bg1">
+                  <a:lumMod val="85000"/>
+                </a:schemeClr>
+              </a:gs>
+              <a:gs pos="100000">
+                <a:schemeClr val="bg1"/>
+              </a:gs>
+            </a:gsLst>
+            <a:path path="circle">
+              <a:fillToRect l="50000" t="50000" r="50000" b="50000"/>
+            </a:path>
+            <a:tileRect/>
+          </a:gradFill>
+          <a:ln w="9525">
+            <a:solidFill>
+              <a:schemeClr val="tx1"/>
+            </a:solidFill>
+            <a:round/>
+            <a:headEnd/>
+            <a:tailEnd/>
+          </a:ln>
+          <a:effectLst/>
+        </p:spPr>
+        <p:txBody>
+          <a:bodyPr wrap="none" anchor="ctr"/>
+          <a:lstStyle/>
+          <a:p>
+            <a:endParaRPr lang="en-US">
+              <a:latin typeface="+mn-lt"/>
+            </a:endParaRPr>
+          </a:p>
+        </p:txBody>
+      </p:sp>
+      <p:sp>
+        <p:nvSpPr>
+          <p:cNvPr id="6" name="Line 24"/>
+          <p:cNvSpPr>
+            <a:spLocks noChangeShapeType="1"/>
+          </p:cNvSpPr>
+          <p:nvPr/>
+        </p:nvSpPr>
+        <p:spPr bwMode="auto">
+          <a:xfrm flipV="1">
+            <a:off x="3605087" y="2285999"/>
+            <a:ext cx="1728913" cy="1709989"/>
+          </a:xfrm>
+          <a:prstGeom prst="line">
+            <a:avLst/>
+          </a:prstGeom>
+          <a:noFill/>
           <a:ln w="25400">
             <a:solidFill>
               <a:schemeClr val="tx1"/>
             </a:solidFill>
+            <a:round/>
+            <a:headEnd type="none" w="med" len="sm"/>
             <a:tailEnd type="stealth" w="lg" len="med"/>
           </a:ln>
+          <a:effectLst/>
         </p:spPr>
-        <p:style>
-          <a:lnRef idx="1">
-            <a:schemeClr val="accent1"/>
-          </a:lnRef>
-          <a:fillRef idx="0">
-            <a:schemeClr val="accent1"/>
-          </a:fillRef>
-          <a:effectRef idx="0">
-            <a:schemeClr val="accent1"/>
-          </a:effectRef>
-          <a:fontRef idx="minor">
-            <a:schemeClr val="tx1"/>
-          </a:fontRef>
-        </p:style>
-        <p:txBody>
-          <a:bodyPr rtlCol="0" anchor="ctr"/>
-          <a:lstStyle/>
-          <a:p>
-            <a:pPr algn="ctr"/>
-            <a:endParaRPr lang="en-US"/>
-          </a:p>
-        </p:txBody>
-      </p:sp>
-      <p:sp>
-        <p:nvSpPr>
-          <p:cNvPr id="81" name="TextBox 80"/>
-          <p:cNvSpPr txBox="1"/>
+        <p:txBody>
+          <a:bodyPr/>
+          <a:lstStyle/>
+          <a:p>
+            <a:endParaRPr lang="en-US"/>
+          </a:p>
+        </p:txBody>
+      </p:sp>
+      <p:sp>
+        <p:nvSpPr>
+          <p:cNvPr id="7" name="Text Box 46"/>
+          <p:cNvSpPr txBox="1">
+            <a:spLocks noChangeArrowheads="1"/>
+          </p:cNvSpPr>
           <p:nvPr/>
         </p:nvSpPr>
-        <p:spPr>
+        <p:spPr bwMode="auto">
           <a:xfrm>
-            <a:off x="2313991" y="4749283"/>
-            <a:ext cx="961053" cy="523220"/>
+            <a:off x="5105400" y="2743200"/>
+            <a:ext cx="699615" cy="307777"/>
           </a:xfrm>
           <a:prstGeom prst="rect">
             <a:avLst/>
           </a:prstGeom>
           <a:noFill/>
+          <a:ln w="9525">
+            <a:noFill/>
+            <a:miter lim="800000"/>
+            <a:headEnd/>
+            <a:tailEnd/>
+          </a:ln>
+          <a:effectLst/>
         </p:spPr>
         <p:txBody>
-          <a:bodyPr wrap="square" rtlCol="0">
+          <a:bodyPr wrap="none">
             <a:spAutoFit/>
           </a:bodyPr>
           <a:lstStyle/>
@@ -3290,7 +3157,7 @@
               <a:rPr lang="en-US" sz="1400" dirty="0" smtClean="0">
                 <a:latin typeface="Garamond" pitchFamily="18" charset="0"/>
               </a:rPr>
-              <a:t>Greenwich meridian</a:t>
+              <a:t>particle</a:t>
             </a:r>
             <a:endParaRPr lang="en-US" sz="1400" dirty="0">
               <a:latin typeface="Garamond" pitchFamily="18" charset="0"/>
@@ -3300,182 +3167,123 @@
       </p:sp>
       <p:sp>
         <p:nvSpPr>
-          <p:cNvPr id="64" name="TextBox 63"/>
-          <p:cNvSpPr txBox="1"/>
+          <p:cNvPr id="8" name="Line 24"/>
+          <p:cNvSpPr>
+            <a:spLocks noChangeShapeType="1"/>
+          </p:cNvSpPr>
           <p:nvPr/>
         </p:nvSpPr>
-        <p:spPr>
-          <a:xfrm>
-            <a:off x="6456784" y="3806889"/>
-            <a:ext cx="1362269" cy="307777"/>
+        <p:spPr bwMode="auto">
+          <a:xfrm flipV="1">
+            <a:off x="3601404" y="2209799"/>
+            <a:ext cx="0" cy="1773237"/>
           </a:xfrm>
-          <a:prstGeom prst="rect">
+          <a:prstGeom prst="line">
             <a:avLst/>
           </a:prstGeom>
           <a:noFill/>
-        </p:spPr>
-        <p:txBody>
-          <a:bodyPr wrap="square" rtlCol="0">
-            <a:spAutoFit/>
-          </a:bodyPr>
-          <a:lstStyle/>
-          <a:p>
-            <a:r>
-              <a:rPr lang="en-US" sz="1400" dirty="0" smtClean="0">
-                <a:latin typeface="Garamond" pitchFamily="18" charset="0"/>
-              </a:rPr>
-              <a:t>Equatorial plane</a:t>
-            </a:r>
-            <a:endParaRPr lang="en-US" sz="1400" dirty="0">
-              <a:latin typeface="Garamond" pitchFamily="18" charset="0"/>
-            </a:endParaRPr>
-          </a:p>
-        </p:txBody>
-      </p:sp>
-      <p:sp>
-        <p:nvSpPr>
-          <p:cNvPr id="95" name="Arc 94"/>
-          <p:cNvSpPr/>
-          <p:nvPr/>
-        </p:nvSpPr>
-        <p:spPr>
-          <a:xfrm rot="10800000">
-            <a:off x="4366726" y="1726163"/>
-            <a:ext cx="457202" cy="214604"/>
-          </a:xfrm>
-          <a:prstGeom prst="arc">
-            <a:avLst>
-              <a:gd name="adj1" fmla="val 11263464"/>
-              <a:gd name="adj2" fmla="val 10883140"/>
-            </a:avLst>
-          </a:prstGeom>
-          <a:ln w="12700">
+          <a:ln w="25400">
             <a:solidFill>
               <a:schemeClr val="tx1"/>
             </a:solidFill>
-            <a:prstDash val="solid"/>
+            <a:round/>
+            <a:headEnd type="none" w="med" len="sm"/>
+            <a:tailEnd type="stealth" w="lg" len="med"/>
           </a:ln>
+          <a:effectLst/>
         </p:spPr>
-        <p:style>
-          <a:lnRef idx="1">
-            <a:schemeClr val="accent1"/>
-          </a:lnRef>
-          <a:fillRef idx="0">
-            <a:schemeClr val="accent1"/>
-          </a:fillRef>
-          <a:effectRef idx="0">
-            <a:schemeClr val="accent1"/>
-          </a:effectRef>
-          <a:fontRef idx="minor">
-            <a:schemeClr val="tx1"/>
-          </a:fontRef>
-        </p:style>
-        <p:txBody>
-          <a:bodyPr rtlCol="0" anchor="ctr"/>
-          <a:lstStyle/>
-          <a:p>
-            <a:pPr algn="ctr"/>
-            <a:endParaRPr lang="en-US"/>
-          </a:p>
-        </p:txBody>
-      </p:sp>
-      <p:sp>
-        <p:nvSpPr>
-          <p:cNvPr id="100" name="Arc 99"/>
-          <p:cNvSpPr/>
+        <p:txBody>
+          <a:bodyPr/>
+          <a:lstStyle/>
+          <a:p>
+            <a:endParaRPr lang="en-US"/>
+          </a:p>
+        </p:txBody>
+      </p:sp>
+      <p:sp>
+        <p:nvSpPr>
+          <p:cNvPr id="9" name="Line 25"/>
+          <p:cNvSpPr>
+            <a:spLocks noChangeShapeType="1"/>
+          </p:cNvSpPr>
           <p:nvPr/>
         </p:nvSpPr>
-        <p:spPr>
-          <a:xfrm rot="10800000">
-            <a:off x="4338733" y="1194318"/>
-            <a:ext cx="522516" cy="289250"/>
+        <p:spPr bwMode="auto">
+          <a:xfrm rot="5400000" flipV="1">
+            <a:off x="4389915" y="3188176"/>
+            <a:ext cx="0" cy="1583371"/>
           </a:xfrm>
-          <a:prstGeom prst="arc">
-            <a:avLst>
-              <a:gd name="adj1" fmla="val 9052599"/>
-              <a:gd name="adj2" fmla="val 1722148"/>
-            </a:avLst>
+          <a:prstGeom prst="line">
+            <a:avLst/>
           </a:prstGeom>
-          <a:ln w="15875">
+          <a:noFill/>
+          <a:ln w="25400">
             <a:solidFill>
               <a:schemeClr val="tx1"/>
             </a:solidFill>
-            <a:prstDash val="sysDash"/>
-            <a:headEnd type="triangle"/>
-            <a:tailEnd type="none" w="lg" len="med"/>
+            <a:round/>
+            <a:headEnd type="none" w="med" len="sm"/>
+            <a:tailEnd type="stealth" w="lg" len="med"/>
           </a:ln>
+          <a:effectLst/>
         </p:spPr>
-        <p:style>
-          <a:lnRef idx="1">
-            <a:schemeClr val="accent1"/>
-          </a:lnRef>
-          <a:fillRef idx="0">
-            <a:schemeClr val="accent1"/>
-          </a:fillRef>
-          <a:effectRef idx="0">
-            <a:schemeClr val="accent1"/>
-          </a:effectRef>
-          <a:fontRef idx="minor">
-            <a:schemeClr val="tx1"/>
-          </a:fontRef>
-        </p:style>
-        <p:txBody>
-          <a:bodyPr rtlCol="0" anchor="ctr"/>
-          <a:lstStyle/>
-          <a:p>
-            <a:pPr algn="ctr"/>
-            <a:endParaRPr lang="en-US"/>
-          </a:p>
-        </p:txBody>
-      </p:sp>
-      <p:cxnSp>
-        <p:nvCxnSpPr>
-          <p:cNvPr id="104" name="Straight Arrow Connector 103"/>
-          <p:cNvCxnSpPr>
-            <a:stCxn id="64" idx="1"/>
-          </p:cNvCxnSpPr>
+        <p:txBody>
+          <a:bodyPr/>
+          <a:lstStyle/>
+          <a:p>
+            <a:endParaRPr lang="en-US"/>
+          </a:p>
+        </p:txBody>
+      </p:sp>
+      <p:sp>
+        <p:nvSpPr>
+          <p:cNvPr id="16" name="Line 40"/>
+          <p:cNvSpPr>
+            <a:spLocks noChangeShapeType="1"/>
+          </p:cNvSpPr>
           <p:nvPr/>
-        </p:nvCxnSpPr>
-        <p:spPr>
-          <a:xfrm flipH="1" flipV="1">
-            <a:off x="5822302" y="3732245"/>
-            <a:ext cx="634482" cy="228533"/>
+        </p:nvSpPr>
+        <p:spPr bwMode="auto">
+          <a:xfrm rot="16200000" flipH="1" flipV="1">
+            <a:off x="2757648" y="3955256"/>
+            <a:ext cx="825500" cy="862012"/>
           </a:xfrm>
-          <a:prstGeom prst="straightConnector1">
+          <a:prstGeom prst="line">
             <a:avLst/>
           </a:prstGeom>
-          <a:ln w="15875">
+          <a:noFill/>
+          <a:ln w="25400">
             <a:solidFill>
               <a:schemeClr val="tx1"/>
             </a:solidFill>
+            <a:round/>
+            <a:headEnd type="none" w="med" len="sm"/>
             <a:tailEnd type="stealth" w="lg" len="med"/>
           </a:ln>
+          <a:effectLst/>
         </p:spPr>
-        <p:style>
-          <a:lnRef idx="1">
-            <a:schemeClr val="accent1"/>
-          </a:lnRef>
-          <a:fillRef idx="0">
-            <a:schemeClr val="accent1"/>
-          </a:fillRef>
-          <a:effectRef idx="0">
-            <a:schemeClr val="accent1"/>
-          </a:effectRef>
-          <a:fontRef idx="minor">
-            <a:schemeClr val="tx1"/>
-          </a:fontRef>
-        </p:style>
-      </p:cxnSp>
-      <p:sp>
-        <p:nvSpPr>
-          <p:cNvPr id="109" name="Oval 108"/>
-          <p:cNvSpPr/>
+        <p:txBody>
+          <a:bodyPr/>
+          <a:lstStyle/>
+          <a:p>
+            <a:endParaRPr lang="en-US">
+              <a:latin typeface="+mn-lt"/>
+            </a:endParaRPr>
+          </a:p>
+        </p:txBody>
+      </p:sp>
+      <p:sp>
+        <p:nvSpPr>
+          <p:cNvPr id="18" name="Oval 44"/>
+          <p:cNvSpPr>
+            <a:spLocks noChangeAspect="1" noChangeArrowheads="1"/>
+          </p:cNvSpPr>
           <p:nvPr/>
         </p:nvSpPr>
-        <p:spPr>
+        <p:spPr bwMode="auto">
           <a:xfrm>
-            <a:off x="5273740" y="2494579"/>
-            <a:ext cx="90001" cy="90001"/>
+            <a:off x="4724400" y="2743200"/>
+            <a:ext cx="136525" cy="136525"/>
           </a:xfrm>
           <a:prstGeom prst="ellipse">
             <a:avLst/>
@@ -3483,99 +3291,268 @@
           <a:solidFill>
             <a:schemeClr val="tx1"/>
           </a:solidFill>
+          <a:ln w="9525">
+            <a:solidFill>
+              <a:schemeClr val="tx1"/>
+            </a:solidFill>
+            <a:round/>
+            <a:headEnd/>
+            <a:tailEnd/>
+          </a:ln>
+          <a:effectLst/>
+        </p:spPr>
+        <p:txBody>
+          <a:bodyPr wrap="none" anchor="ctr"/>
+          <a:lstStyle/>
+          <a:p>
+            <a:endParaRPr lang="en-US" dirty="0">
+              <a:latin typeface="+mn-lt"/>
+            </a:endParaRPr>
+          </a:p>
+        </p:txBody>
+      </p:sp>
+      <p:sp>
+        <p:nvSpPr>
+          <p:cNvPr id="19" name="Line 36"/>
+          <p:cNvSpPr>
+            <a:spLocks noChangeShapeType="1"/>
+          </p:cNvSpPr>
+          <p:nvPr/>
+        </p:nvSpPr>
+        <p:spPr bwMode="auto">
+          <a:xfrm flipV="1">
+            <a:off x="3609341" y="3557079"/>
+            <a:ext cx="1373441" cy="416941"/>
+          </a:xfrm>
+          <a:prstGeom prst="line">
+            <a:avLst/>
+          </a:prstGeom>
+          <a:noFill/>
           <a:ln w="25400">
             <a:solidFill>
               <a:schemeClr val="tx1"/>
             </a:solidFill>
+            <a:prstDash val="dash"/>
+            <a:round/>
+            <a:headEnd type="none" w="med" len="sm"/>
             <a:tailEnd type="stealth" w="lg" len="med"/>
           </a:ln>
+          <a:effectLst/>
         </p:spPr>
-        <p:style>
-          <a:lnRef idx="1">
-            <a:schemeClr val="accent1"/>
-          </a:lnRef>
-          <a:fillRef idx="0">
-            <a:schemeClr val="accent1"/>
-          </a:fillRef>
-          <a:effectRef idx="0">
-            <a:schemeClr val="accent1"/>
-          </a:effectRef>
-          <a:fontRef idx="minor">
-            <a:schemeClr val="tx1"/>
-          </a:fontRef>
-        </p:style>
-        <p:txBody>
-          <a:bodyPr rtlCol="0" anchor="ctr"/>
-          <a:lstStyle/>
-          <a:p>
-            <a:pPr algn="ctr"/>
-            <a:endParaRPr lang="en-US"/>
-          </a:p>
-        </p:txBody>
-      </p:sp>
-      <p:sp>
-        <p:nvSpPr>
-          <p:cNvPr id="122" name="Arc 121"/>
-          <p:cNvSpPr/>
+        <p:txBody>
+          <a:bodyPr/>
+          <a:lstStyle/>
+          <a:p>
+            <a:endParaRPr lang="en-US"/>
+          </a:p>
+        </p:txBody>
+      </p:sp>
+      <p:sp>
+        <p:nvSpPr>
+          <p:cNvPr id="20" name="Line 19"/>
+          <p:cNvSpPr>
+            <a:spLocks noChangeAspect="1" noChangeShapeType="1"/>
+          </p:cNvSpPr>
           <p:nvPr/>
         </p:nvSpPr>
-        <p:spPr>
-          <a:xfrm>
-            <a:off x="3306147" y="2864497"/>
-            <a:ext cx="2572138" cy="1113450"/>
+        <p:spPr bwMode="auto">
+          <a:xfrm flipV="1">
+            <a:off x="3635753" y="2864497"/>
+            <a:ext cx="1102372" cy="1102372"/>
           </a:xfrm>
-          <a:prstGeom prst="arc">
-            <a:avLst>
-              <a:gd name="adj1" fmla="val 1557383"/>
-              <a:gd name="adj2" fmla="val 8982820"/>
-            </a:avLst>
+          <a:prstGeom prst="line">
+            <a:avLst/>
           </a:prstGeom>
-          <a:ln w="12700">
+          <a:noFill/>
+          <a:ln w="25400">
             <a:solidFill>
               <a:schemeClr val="tx1"/>
             </a:solidFill>
-            <a:headEnd type="stealth"/>
-            <a:tailEnd type="none"/>
+            <a:round/>
+            <a:headEnd type="none" w="med" len="sm"/>
+            <a:tailEnd type="stealth" w="lg" len="med"/>
           </a:ln>
+          <a:effectLst/>
         </p:spPr>
-        <p:style>
-          <a:lnRef idx="1">
-            <a:schemeClr val="accent1"/>
-          </a:lnRef>
-          <a:fillRef idx="0">
-            <a:schemeClr val="accent1"/>
-          </a:fillRef>
-          <a:effectRef idx="0">
-            <a:schemeClr val="accent1"/>
-          </a:effectRef>
-          <a:fontRef idx="minor">
-            <a:schemeClr val="tx1"/>
-          </a:fontRef>
-        </p:style>
-        <p:txBody>
-          <a:bodyPr rtlCol="0" anchor="ctr"/>
-          <a:lstStyle/>
-          <a:p>
-            <a:pPr algn="ctr"/>
-            <a:endParaRPr lang="en-US"/>
+        <p:txBody>
+          <a:bodyPr/>
+          <a:lstStyle/>
+          <a:p>
+            <a:endParaRPr lang="en-US"/>
+          </a:p>
+        </p:txBody>
+      </p:sp>
+      <p:sp>
+        <p:nvSpPr>
+          <p:cNvPr id="21" name="Line 24"/>
+          <p:cNvSpPr>
+            <a:spLocks noChangeShapeType="1"/>
+          </p:cNvSpPr>
+          <p:nvPr/>
+        </p:nvSpPr>
+        <p:spPr bwMode="auto">
+          <a:xfrm flipH="1" flipV="1">
+            <a:off x="3105214" y="3532694"/>
+            <a:ext cx="487679" cy="438911"/>
+          </a:xfrm>
+          <a:prstGeom prst="line">
+            <a:avLst/>
+          </a:prstGeom>
+          <a:noFill/>
+          <a:ln w="25400">
+            <a:solidFill>
+              <a:schemeClr val="tx1"/>
+            </a:solidFill>
+            <a:round/>
+            <a:headEnd type="none" w="med" len="sm"/>
+            <a:tailEnd type="stealth" w="lg" len="med"/>
+          </a:ln>
+          <a:effectLst/>
+        </p:spPr>
+        <p:txBody>
+          <a:bodyPr/>
+          <a:lstStyle/>
+          <a:p>
+            <a:endParaRPr lang="en-US"/>
+          </a:p>
+        </p:txBody>
+      </p:sp>
+      <p:sp>
+        <p:nvSpPr>
+          <p:cNvPr id="22" name="Line 24"/>
+          <p:cNvSpPr>
+            <a:spLocks noChangeShapeType="1"/>
+          </p:cNvSpPr>
+          <p:nvPr/>
+        </p:nvSpPr>
+        <p:spPr bwMode="auto">
+          <a:xfrm>
+            <a:off x="3617280" y="3983799"/>
+            <a:ext cx="36576" cy="512064"/>
+          </a:xfrm>
+          <a:prstGeom prst="line">
+            <a:avLst/>
+          </a:prstGeom>
+          <a:noFill/>
+          <a:ln w="25400">
+            <a:solidFill>
+              <a:schemeClr val="tx1"/>
+            </a:solidFill>
+            <a:round/>
+            <a:headEnd type="none" w="med" len="sm"/>
+            <a:tailEnd type="stealth" w="lg" len="med"/>
+          </a:ln>
+          <a:effectLst/>
+        </p:spPr>
+        <p:txBody>
+          <a:bodyPr/>
+          <a:lstStyle/>
+          <a:p>
+            <a:endParaRPr lang="en-US"/>
+          </a:p>
+        </p:txBody>
+      </p:sp>
+      <p:sp>
+        <p:nvSpPr>
+          <p:cNvPr id="26" name="Text Box 69"/>
+          <p:cNvSpPr txBox="1">
+            <a:spLocks noChangeArrowheads="1"/>
+          </p:cNvSpPr>
+          <p:nvPr/>
+        </p:nvSpPr>
+        <p:spPr bwMode="auto">
+          <a:xfrm>
+            <a:off x="3946610" y="4452930"/>
+            <a:ext cx="1225335" cy="307777"/>
+          </a:xfrm>
+          <a:prstGeom prst="rect">
+            <a:avLst/>
+          </a:prstGeom>
+          <a:noFill/>
+          <a:ln w="9525">
+            <a:noFill/>
+            <a:miter lim="800000"/>
+            <a:headEnd/>
+            <a:tailEnd/>
+          </a:ln>
+          <a:effectLst/>
+        </p:spPr>
+        <p:txBody>
+          <a:bodyPr wrap="none">
+            <a:spAutoFit/>
+          </a:bodyPr>
+          <a:lstStyle/>
+          <a:p>
+            <a:r>
+              <a:rPr lang="en-US" sz="1400" dirty="0" smtClean="0">
+                <a:latin typeface="Garamond" pitchFamily="18" charset="0"/>
+              </a:rPr>
+              <a:t>Rotating frame</a:t>
+            </a:r>
+            <a:endParaRPr lang="en-US" sz="1400" dirty="0">
+              <a:latin typeface="Garamond" pitchFamily="18" charset="0"/>
+            </a:endParaRPr>
+          </a:p>
+        </p:txBody>
+      </p:sp>
+      <p:sp>
+        <p:nvSpPr>
+          <p:cNvPr id="27" name="Text Box 69"/>
+          <p:cNvSpPr txBox="1">
+            <a:spLocks noChangeArrowheads="1"/>
+          </p:cNvSpPr>
+          <p:nvPr/>
+        </p:nvSpPr>
+        <p:spPr bwMode="auto">
+          <a:xfrm>
+            <a:off x="2849205" y="4857382"/>
+            <a:ext cx="1553630" cy="307777"/>
+          </a:xfrm>
+          <a:prstGeom prst="rect">
+            <a:avLst/>
+          </a:prstGeom>
+          <a:noFill/>
+          <a:ln w="9525">
+            <a:noFill/>
+            <a:miter lim="800000"/>
+            <a:headEnd/>
+            <a:tailEnd/>
+          </a:ln>
+          <a:effectLst/>
+        </p:spPr>
+        <p:txBody>
+          <a:bodyPr wrap="none">
+            <a:spAutoFit/>
+          </a:bodyPr>
+          <a:lstStyle/>
+          <a:p>
+            <a:r>
+              <a:rPr lang="en-US" sz="1400" dirty="0" smtClean="0">
+                <a:latin typeface="Garamond" pitchFamily="18" charset="0"/>
+              </a:rPr>
+              <a:t>Non-rotating frame</a:t>
+            </a:r>
+            <a:endParaRPr lang="en-US" sz="1400" dirty="0">
+              <a:latin typeface="Garamond" pitchFamily="18" charset="0"/>
+            </a:endParaRPr>
           </a:p>
         </p:txBody>
       </p:sp>
       <p:graphicFrame>
         <p:nvGraphicFramePr>
-          <p:cNvPr id="15382" name="Object 22"/>
+          <p:cNvPr id="29" name="Object 28"/>
           <p:cNvGraphicFramePr>
             <a:graphicFrameLocks noChangeAspect="1"/>
           </p:cNvGraphicFramePr>
           <p:nvPr/>
         </p:nvGraphicFramePr>
         <p:xfrm>
-          <a:off x="4849813" y="1093788"/>
-          <a:ext cx="377825" cy="422275"/>
+          <a:off x="2590800" y="4800600"/>
+          <a:ext cx="211138" cy="315913"/>
         </p:xfrm>
         <a:graphic>
           <a:graphicData uri="http://schemas.openxmlformats.org/presentationml/2006/ole">
-            <p:oleObj spid="_x0000_s15382" name="Equation" r:id="rId3" imgW="203040" imgH="228600" progId="Equation.DSMT4">
+            <p:oleObj spid="_x0000_s1027" name="Equation" r:id="rId3" imgW="152280" imgH="228600" progId="Equation.DSMT4">
               <p:embed/>
             </p:oleObj>
           </a:graphicData>
@@ -3583,19 +3560,19 @@
       </p:graphicFrame>
       <p:graphicFrame>
         <p:nvGraphicFramePr>
-          <p:cNvPr id="15383" name="Object 23"/>
+          <p:cNvPr id="1029" name="Object 2"/>
           <p:cNvGraphicFramePr>
             <a:graphicFrameLocks noChangeAspect="1"/>
           </p:cNvGraphicFramePr>
           <p:nvPr/>
         </p:nvGraphicFramePr>
         <p:xfrm>
-          <a:off x="2411380" y="4397084"/>
-          <a:ext cx="306388" cy="422275"/>
+          <a:off x="5257800" y="3810000"/>
+          <a:ext cx="211138" cy="315913"/>
         </p:xfrm>
         <a:graphic>
           <a:graphicData uri="http://schemas.openxmlformats.org/presentationml/2006/ole">
-            <p:oleObj spid="_x0000_s15383" name="Equation" r:id="rId4" imgW="164880" imgH="228600" progId="Equation.DSMT4">
+            <p:oleObj spid="_x0000_s1029" name="Equation" r:id="rId4" imgW="152280" imgH="228600" progId="Equation.DSMT4">
               <p:embed/>
             </p:oleObj>
           </a:graphicData>
@@ -3603,19 +3580,19 @@
       </p:graphicFrame>
       <p:graphicFrame>
         <p:nvGraphicFramePr>
-          <p:cNvPr id="15384" name="Object 24"/>
+          <p:cNvPr id="1030" name="Object 2"/>
           <p:cNvGraphicFramePr>
             <a:graphicFrameLocks noChangeAspect="1"/>
           </p:cNvGraphicFramePr>
           <p:nvPr/>
         </p:nvGraphicFramePr>
         <p:xfrm>
-          <a:off x="7283450" y="3233738"/>
-          <a:ext cx="330200" cy="422275"/>
+          <a:off x="3276600" y="2057400"/>
+          <a:ext cx="193675" cy="315913"/>
         </p:xfrm>
         <a:graphic>
           <a:graphicData uri="http://schemas.openxmlformats.org/presentationml/2006/ole">
-            <p:oleObj spid="_x0000_s15384" name="Equation" r:id="rId5" imgW="177480" imgH="228600" progId="Equation.DSMT4">
+            <p:oleObj spid="_x0000_s1030" name="Equation" r:id="rId5" imgW="139680" imgH="228600" progId="Equation.DSMT4">
               <p:embed/>
             </p:oleObj>
           </a:graphicData>
@@ -3623,19 +3600,19 @@
       </p:graphicFrame>
       <p:graphicFrame>
         <p:nvGraphicFramePr>
-          <p:cNvPr id="15385" name="Object 25"/>
+          <p:cNvPr id="1031" name="Object 2"/>
           <p:cNvGraphicFramePr>
             <a:graphicFrameLocks noChangeAspect="1"/>
           </p:cNvGraphicFramePr>
           <p:nvPr/>
         </p:nvGraphicFramePr>
         <p:xfrm>
-          <a:off x="4240213" y="801688"/>
-          <a:ext cx="282575" cy="422275"/>
+          <a:off x="2828925" y="3348038"/>
+          <a:ext cx="246063" cy="315912"/>
         </p:xfrm>
         <a:graphic>
           <a:graphicData uri="http://schemas.openxmlformats.org/presentationml/2006/ole">
-            <p:oleObj spid="_x0000_s15385" name="Equation" r:id="rId6" imgW="152280" imgH="228600" progId="Equation.DSMT4">
+            <p:oleObj spid="_x0000_s1031" name="Equation" r:id="rId6" imgW="177480" imgH="228600" progId="Equation.DSMT4">
               <p:embed/>
             </p:oleObj>
           </a:graphicData>
@@ -3643,278 +3620,19 @@
       </p:graphicFrame>
       <p:graphicFrame>
         <p:nvGraphicFramePr>
-          <p:cNvPr id="15386" name="Object 26"/>
+          <p:cNvPr id="1032" name="Object 2"/>
           <p:cNvGraphicFramePr>
             <a:graphicFrameLocks noChangeAspect="1"/>
           </p:cNvGraphicFramePr>
           <p:nvPr/>
         </p:nvGraphicFramePr>
         <p:xfrm>
-          <a:off x="6006751" y="1595535"/>
-          <a:ext cx="980466" cy="337392"/>
+          <a:off x="5029200" y="1981200"/>
+          <a:ext cx="228600" cy="315913"/>
         </p:xfrm>
         <a:graphic>
           <a:graphicData uri="http://schemas.openxmlformats.org/presentationml/2006/ole">
-            <p:oleObj spid="_x0000_s15386" name="Equation" r:id="rId7" imgW="660240" imgH="228600" progId="Equation.DSMT4">
-              <p:embed/>
-            </p:oleObj>
-          </a:graphicData>
-        </a:graphic>
-      </p:graphicFrame>
-      <p:cxnSp>
-        <p:nvCxnSpPr>
-          <p:cNvPr id="41" name="Straight Arrow Connector 40"/>
-          <p:cNvCxnSpPr/>
-          <p:nvPr/>
-        </p:nvCxnSpPr>
-        <p:spPr>
-          <a:xfrm flipV="1">
-            <a:off x="4572617" y="3424335"/>
-            <a:ext cx="2695930" cy="5479"/>
-          </a:xfrm>
-          <a:prstGeom prst="straightConnector1">
-            <a:avLst/>
-          </a:prstGeom>
-          <a:ln w="15875">
-            <a:solidFill>
-              <a:schemeClr val="tx1"/>
-            </a:solidFill>
-            <a:tailEnd type="stealth" w="lg" len="med"/>
-          </a:ln>
-        </p:spPr>
-        <p:style>
-          <a:lnRef idx="1">
-            <a:schemeClr val="accent1"/>
-          </a:lnRef>
-          <a:fillRef idx="0">
-            <a:schemeClr val="accent1"/>
-          </a:fillRef>
-          <a:effectRef idx="0">
-            <a:schemeClr val="accent1"/>
-          </a:effectRef>
-          <a:fontRef idx="minor">
-            <a:schemeClr val="tx1"/>
-          </a:fontRef>
-        </p:style>
-      </p:cxnSp>
-      <p:cxnSp>
-        <p:nvCxnSpPr>
-          <p:cNvPr id="71" name="Straight Arrow Connector 70"/>
-          <p:cNvCxnSpPr/>
-          <p:nvPr/>
-        </p:nvCxnSpPr>
-        <p:spPr>
-          <a:xfrm flipH="1">
-            <a:off x="2724539" y="3442994"/>
-            <a:ext cx="1833561" cy="1017039"/>
-          </a:xfrm>
-          <a:prstGeom prst="straightConnector1">
-            <a:avLst/>
-          </a:prstGeom>
-          <a:ln w="15875">
-            <a:solidFill>
-              <a:schemeClr val="tx1"/>
-            </a:solidFill>
-            <a:tailEnd type="stealth" w="lg" len="med"/>
-          </a:ln>
-        </p:spPr>
-        <p:style>
-          <a:lnRef idx="1">
-            <a:schemeClr val="accent1"/>
-          </a:lnRef>
-          <a:fillRef idx="0">
-            <a:schemeClr val="accent1"/>
-          </a:fillRef>
-          <a:effectRef idx="0">
-            <a:schemeClr val="accent1"/>
-          </a:effectRef>
-          <a:fontRef idx="minor">
-            <a:schemeClr val="tx1"/>
-          </a:fontRef>
-        </p:style>
-      </p:cxnSp>
-      <p:sp>
-        <p:nvSpPr>
-          <p:cNvPr id="70" name="Arc 69"/>
-          <p:cNvSpPr/>
-          <p:nvPr/>
-        </p:nvSpPr>
-        <p:spPr>
-          <a:xfrm rot="6251086">
-            <a:off x="2840016" y="2474022"/>
-            <a:ext cx="3541615" cy="1931205"/>
-          </a:xfrm>
-          <a:prstGeom prst="arc">
-            <a:avLst>
-              <a:gd name="adj1" fmla="val 8293"/>
-              <a:gd name="adj2" fmla="val 10742641"/>
-            </a:avLst>
-          </a:prstGeom>
-          <a:ln w="15875">
-            <a:solidFill>
-              <a:schemeClr val="tx1"/>
-            </a:solidFill>
-          </a:ln>
-        </p:spPr>
-        <p:style>
-          <a:lnRef idx="1">
-            <a:schemeClr val="accent1"/>
-          </a:lnRef>
-          <a:fillRef idx="0">
-            <a:schemeClr val="accent1"/>
-          </a:fillRef>
-          <a:effectRef idx="0">
-            <a:schemeClr val="accent1"/>
-          </a:effectRef>
-          <a:fontRef idx="minor">
-            <a:schemeClr val="tx1"/>
-          </a:fontRef>
-        </p:style>
-        <p:txBody>
-          <a:bodyPr rtlCol="0" anchor="ctr"/>
-          <a:lstStyle/>
-          <a:p>
-            <a:pPr algn="ctr"/>
-            <a:endParaRPr lang="en-US"/>
-          </a:p>
-        </p:txBody>
-      </p:sp>
-      <p:sp>
-        <p:nvSpPr>
-          <p:cNvPr id="103" name="Arc 102"/>
-          <p:cNvSpPr/>
-          <p:nvPr/>
-        </p:nvSpPr>
-        <p:spPr>
-          <a:xfrm rot="15150085">
-            <a:off x="2908894" y="2468226"/>
-            <a:ext cx="3514017" cy="1891789"/>
-          </a:xfrm>
-          <a:prstGeom prst="arc">
-            <a:avLst>
-              <a:gd name="adj1" fmla="val 42011"/>
-              <a:gd name="adj2" fmla="val 10761422"/>
-            </a:avLst>
-          </a:prstGeom>
-          <a:ln w="15875">
-            <a:solidFill>
-              <a:schemeClr val="tx1"/>
-            </a:solidFill>
-          </a:ln>
-        </p:spPr>
-        <p:style>
-          <a:lnRef idx="1">
-            <a:schemeClr val="accent1"/>
-          </a:lnRef>
-          <a:fillRef idx="0">
-            <a:schemeClr val="accent1"/>
-          </a:fillRef>
-          <a:effectRef idx="0">
-            <a:schemeClr val="accent1"/>
-          </a:effectRef>
-          <a:fontRef idx="minor">
-            <a:schemeClr val="tx1"/>
-          </a:fontRef>
-        </p:style>
-        <p:txBody>
-          <a:bodyPr rtlCol="0" anchor="ctr"/>
-          <a:lstStyle/>
-          <a:p>
-            <a:pPr algn="ctr"/>
-            <a:endParaRPr lang="en-US"/>
-          </a:p>
-        </p:txBody>
-      </p:sp>
-      <p:cxnSp>
-        <p:nvCxnSpPr>
-          <p:cNvPr id="110" name="Straight Arrow Connector 109"/>
-          <p:cNvCxnSpPr>
-            <a:endCxn id="109" idx="3"/>
-          </p:cNvCxnSpPr>
-          <p:nvPr/>
-        </p:nvCxnSpPr>
-        <p:spPr>
-          <a:xfrm flipV="1">
-            <a:off x="4572000" y="2571400"/>
-            <a:ext cx="714920" cy="852936"/>
-          </a:xfrm>
-          <a:prstGeom prst="straightConnector1">
-            <a:avLst/>
-          </a:prstGeom>
-          <a:ln w="15875">
-            <a:solidFill>
-              <a:schemeClr val="tx1"/>
-            </a:solidFill>
-            <a:tailEnd type="none" w="lg" len="med"/>
-          </a:ln>
-        </p:spPr>
-        <p:style>
-          <a:lnRef idx="1">
-            <a:schemeClr val="accent1"/>
-          </a:lnRef>
-          <a:fillRef idx="0">
-            <a:schemeClr val="accent1"/>
-          </a:fillRef>
-          <a:effectRef idx="0">
-            <a:schemeClr val="accent1"/>
-          </a:effectRef>
-          <a:fontRef idx="minor">
-            <a:schemeClr val="tx1"/>
-          </a:fontRef>
-        </p:style>
-      </p:cxnSp>
-      <p:cxnSp>
-        <p:nvCxnSpPr>
-          <p:cNvPr id="114" name="Straight Arrow Connector 113"/>
-          <p:cNvCxnSpPr/>
-          <p:nvPr/>
-        </p:nvCxnSpPr>
-        <p:spPr>
-          <a:xfrm>
-            <a:off x="4581331" y="3424336"/>
-            <a:ext cx="1110342" cy="513182"/>
-          </a:xfrm>
-          <a:prstGeom prst="straightConnector1">
-            <a:avLst/>
-          </a:prstGeom>
-          <a:ln w="15875">
-            <a:solidFill>
-              <a:schemeClr val="tx1"/>
-            </a:solidFill>
-            <a:prstDash val="dash"/>
-            <a:tailEnd type="none" w="lg" len="med"/>
-          </a:ln>
-        </p:spPr>
-        <p:style>
-          <a:lnRef idx="1">
-            <a:schemeClr val="accent1"/>
-          </a:lnRef>
-          <a:fillRef idx="0">
-            <a:schemeClr val="accent1"/>
-          </a:fillRef>
-          <a:effectRef idx="0">
-            <a:schemeClr val="accent1"/>
-          </a:effectRef>
-          <a:fontRef idx="minor">
-            <a:schemeClr val="tx1"/>
-          </a:fontRef>
-        </p:style>
-      </p:cxnSp>
-      <p:graphicFrame>
-        <p:nvGraphicFramePr>
-          <p:cNvPr id="123" name="Object 122"/>
-          <p:cNvGraphicFramePr>
-            <a:graphicFrameLocks noChangeAspect="1"/>
-          </p:cNvGraphicFramePr>
-          <p:nvPr/>
-        </p:nvGraphicFramePr>
-        <p:xfrm>
-          <a:off x="4425950" y="3673340"/>
-          <a:ext cx="258018" cy="328387"/>
-        </p:xfrm>
-        <a:graphic>
-          <a:graphicData uri="http://schemas.openxmlformats.org/presentationml/2006/ole">
-            <p:oleObj spid="_x0000_s15380" name="Equation" r:id="rId8" imgW="139680" imgH="177480" progId="Equation.DSMT4">
+            <p:oleObj spid="_x0000_s1032" name="Equation" r:id="rId7" imgW="164880" imgH="228600" progId="Equation.DSMT4">
               <p:embed/>
             </p:oleObj>
           </a:graphicData>
@@ -3922,976 +3640,19 @@
       </p:graphicFrame>
       <p:graphicFrame>
         <p:nvGraphicFramePr>
-          <p:cNvPr id="15381" name="Object 21"/>
+          <p:cNvPr id="1033" name="Object 2"/>
           <p:cNvGraphicFramePr>
             <a:graphicFrameLocks noChangeAspect="1"/>
           </p:cNvGraphicFramePr>
           <p:nvPr/>
         </p:nvGraphicFramePr>
         <p:xfrm>
-          <a:off x="4961423" y="3044046"/>
-          <a:ext cx="258763" cy="304800"/>
+          <a:off x="3733800" y="4419600"/>
+          <a:ext cx="228600" cy="315913"/>
         </p:xfrm>
         <a:graphic>
           <a:graphicData uri="http://schemas.openxmlformats.org/presentationml/2006/ole">
-            <p:oleObj spid="_x0000_s15381" name="Equation" r:id="rId9" imgW="139680" imgH="164880" progId="Equation.DSMT4">
-              <p:embed/>
-            </p:oleObj>
-          </a:graphicData>
-        </a:graphic>
-      </p:graphicFrame>
-      <p:cxnSp>
-        <p:nvCxnSpPr>
-          <p:cNvPr id="40" name="Straight Arrow Connector 39"/>
-          <p:cNvCxnSpPr/>
-          <p:nvPr/>
-        </p:nvCxnSpPr>
-        <p:spPr>
-          <a:xfrm flipV="1">
-            <a:off x="4581948" y="933062"/>
-            <a:ext cx="8714" cy="2506082"/>
-          </a:xfrm>
-          <a:prstGeom prst="straightConnector1">
-            <a:avLst/>
-          </a:prstGeom>
-          <a:ln w="15875">
-            <a:solidFill>
-              <a:schemeClr val="tx1"/>
-            </a:solidFill>
-            <a:tailEnd type="stealth" w="lg" len="med"/>
-          </a:ln>
-        </p:spPr>
-        <p:style>
-          <a:lnRef idx="1">
-            <a:schemeClr val="accent1"/>
-          </a:lnRef>
-          <a:fillRef idx="0">
-            <a:schemeClr val="accent1"/>
-          </a:fillRef>
-          <a:effectRef idx="0">
-            <a:schemeClr val="accent1"/>
-          </a:effectRef>
-          <a:fontRef idx="minor">
-            <a:schemeClr val="tx1"/>
-          </a:fontRef>
-        </p:style>
-      </p:cxnSp>
-      <p:sp>
-        <p:nvSpPr>
-          <p:cNvPr id="124" name="Arc 123"/>
-          <p:cNvSpPr/>
-          <p:nvPr/>
-        </p:nvSpPr>
-        <p:spPr>
-          <a:xfrm rot="16017324">
-            <a:off x="3390715" y="3304997"/>
-            <a:ext cx="2738910" cy="1408107"/>
-          </a:xfrm>
-          <a:prstGeom prst="arc">
-            <a:avLst>
-              <a:gd name="adj1" fmla="val 1092140"/>
-              <a:gd name="adj2" fmla="val 4601547"/>
-            </a:avLst>
-          </a:prstGeom>
-          <a:ln w="12700">
-            <a:solidFill>
-              <a:schemeClr val="tx1"/>
-            </a:solidFill>
-            <a:headEnd type="stealth"/>
-            <a:tailEnd type="none"/>
-          </a:ln>
-        </p:spPr>
-        <p:style>
-          <a:lnRef idx="1">
-            <a:schemeClr val="accent1"/>
-          </a:lnRef>
-          <a:fillRef idx="0">
-            <a:schemeClr val="accent1"/>
-          </a:fillRef>
-          <a:effectRef idx="0">
-            <a:schemeClr val="accent1"/>
-          </a:effectRef>
-          <a:fontRef idx="minor">
-            <a:schemeClr val="tx1"/>
-          </a:fontRef>
-        </p:style>
-        <p:txBody>
-          <a:bodyPr rtlCol="0" anchor="ctr"/>
-          <a:lstStyle/>
-          <a:p>
-            <a:pPr algn="ctr"/>
-            <a:endParaRPr lang="en-US"/>
-          </a:p>
-        </p:txBody>
-      </p:sp>
-      <p:sp>
-        <p:nvSpPr>
-          <p:cNvPr id="141" name="Arc 140"/>
-          <p:cNvSpPr/>
-          <p:nvPr/>
-        </p:nvSpPr>
-        <p:spPr>
-          <a:xfrm rot="6251086">
-            <a:off x="2843120" y="2477126"/>
-            <a:ext cx="3541615" cy="1931205"/>
-          </a:xfrm>
-          <a:prstGeom prst="arc">
-            <a:avLst>
-              <a:gd name="adj1" fmla="val 19984343"/>
-              <a:gd name="adj2" fmla="val 602459"/>
-            </a:avLst>
-          </a:prstGeom>
-          <a:ln w="15875">
-            <a:solidFill>
-              <a:schemeClr val="tx1"/>
-            </a:solidFill>
-            <a:prstDash val="dash"/>
-          </a:ln>
-        </p:spPr>
-        <p:style>
-          <a:lnRef idx="1">
-            <a:schemeClr val="accent1"/>
-          </a:lnRef>
-          <a:fillRef idx="0">
-            <a:schemeClr val="accent1"/>
-          </a:fillRef>
-          <a:effectRef idx="0">
-            <a:schemeClr val="accent1"/>
-          </a:effectRef>
-          <a:fontRef idx="minor">
-            <a:schemeClr val="tx1"/>
-          </a:fontRef>
-        </p:style>
-        <p:txBody>
-          <a:bodyPr rtlCol="0" anchor="ctr"/>
-          <a:lstStyle/>
-          <a:p>
-            <a:pPr algn="ctr"/>
-            <a:endParaRPr lang="en-US"/>
-          </a:p>
-        </p:txBody>
-      </p:sp>
-      <p:sp>
-        <p:nvSpPr>
-          <p:cNvPr id="146" name="Oval 145"/>
-          <p:cNvSpPr/>
-          <p:nvPr/>
-        </p:nvSpPr>
-        <p:spPr>
-          <a:xfrm>
-            <a:off x="3541278" y="3915995"/>
-            <a:ext cx="90001" cy="90001"/>
-          </a:xfrm>
-          <a:prstGeom prst="ellipse">
-            <a:avLst/>
-          </a:prstGeom>
-          <a:solidFill>
-            <a:schemeClr val="tx1"/>
-          </a:solidFill>
-          <a:ln w="25400">
-            <a:solidFill>
-              <a:schemeClr val="tx1"/>
-            </a:solidFill>
-            <a:tailEnd type="stealth" w="lg" len="med"/>
-          </a:ln>
-        </p:spPr>
-        <p:style>
-          <a:lnRef idx="1">
-            <a:schemeClr val="accent1"/>
-          </a:lnRef>
-          <a:fillRef idx="0">
-            <a:schemeClr val="accent1"/>
-          </a:fillRef>
-          <a:effectRef idx="0">
-            <a:schemeClr val="accent1"/>
-          </a:effectRef>
-          <a:fontRef idx="minor">
-            <a:schemeClr val="tx1"/>
-          </a:fontRef>
-        </p:style>
-        <p:txBody>
-          <a:bodyPr rtlCol="0" anchor="ctr"/>
-          <a:lstStyle/>
-          <a:p>
-            <a:pPr algn="ctr"/>
-            <a:endParaRPr lang="en-US"/>
-          </a:p>
-        </p:txBody>
-      </p:sp>
-      <p:sp>
-        <p:nvSpPr>
-          <p:cNvPr id="147" name="Oval 146"/>
-          <p:cNvSpPr/>
-          <p:nvPr/>
-        </p:nvSpPr>
-        <p:spPr>
-          <a:xfrm>
-            <a:off x="4542764" y="1745072"/>
-            <a:ext cx="90001" cy="90001"/>
-          </a:xfrm>
-          <a:prstGeom prst="ellipse">
-            <a:avLst/>
-          </a:prstGeom>
-          <a:solidFill>
-            <a:schemeClr val="tx1"/>
-          </a:solidFill>
-          <a:ln w="25400">
-            <a:solidFill>
-              <a:schemeClr val="tx1"/>
-            </a:solidFill>
-            <a:tailEnd type="stealth" w="lg" len="med"/>
-          </a:ln>
-        </p:spPr>
-        <p:style>
-          <a:lnRef idx="1">
-            <a:schemeClr val="accent1"/>
-          </a:lnRef>
-          <a:fillRef idx="0">
-            <a:schemeClr val="accent1"/>
-          </a:fillRef>
-          <a:effectRef idx="0">
-            <a:schemeClr val="accent1"/>
-          </a:effectRef>
-          <a:fontRef idx="minor">
-            <a:schemeClr val="tx1"/>
-          </a:fontRef>
-        </p:style>
-        <p:txBody>
-          <a:bodyPr rtlCol="0" anchor="ctr"/>
-          <a:lstStyle/>
-          <a:p>
-            <a:pPr algn="ctr"/>
-            <a:endParaRPr lang="en-US"/>
-          </a:p>
-        </p:txBody>
-      </p:sp>
-      <p:sp>
-        <p:nvSpPr>
-          <p:cNvPr id="148" name="Oval 147"/>
-          <p:cNvSpPr/>
-          <p:nvPr/>
-        </p:nvSpPr>
-        <p:spPr>
-          <a:xfrm>
-            <a:off x="5867804" y="1763643"/>
-            <a:ext cx="90001" cy="90001"/>
-          </a:xfrm>
-          <a:prstGeom prst="ellipse">
-            <a:avLst/>
-          </a:prstGeom>
-          <a:solidFill>
-            <a:schemeClr val="tx1"/>
-          </a:solidFill>
-          <a:ln w="25400">
-            <a:solidFill>
-              <a:schemeClr val="tx1"/>
-            </a:solidFill>
-            <a:tailEnd type="stealth" w="lg" len="med"/>
-          </a:ln>
-        </p:spPr>
-        <p:style>
-          <a:lnRef idx="1">
-            <a:schemeClr val="accent1"/>
-          </a:lnRef>
-          <a:fillRef idx="0">
-            <a:schemeClr val="accent1"/>
-          </a:fillRef>
-          <a:effectRef idx="0">
-            <a:schemeClr val="accent1"/>
-          </a:effectRef>
-          <a:fontRef idx="minor">
-            <a:schemeClr val="tx1"/>
-          </a:fontRef>
-        </p:style>
-        <p:txBody>
-          <a:bodyPr rtlCol="0" anchor="ctr"/>
-          <a:lstStyle/>
-          <a:p>
-            <a:pPr algn="ctr"/>
-            <a:endParaRPr lang="en-US"/>
-          </a:p>
-        </p:txBody>
-      </p:sp>
-      <p:cxnSp>
-        <p:nvCxnSpPr>
-          <p:cNvPr id="151" name="Straight Arrow Connector 150"/>
-          <p:cNvCxnSpPr>
-            <a:stCxn id="109" idx="7"/>
-            <a:endCxn id="148" idx="3"/>
-          </p:cNvCxnSpPr>
-          <p:nvPr/>
-        </p:nvCxnSpPr>
-        <p:spPr>
-          <a:xfrm flipV="1">
-            <a:off x="5350561" y="1840464"/>
-            <a:ext cx="530423" cy="667295"/>
-          </a:xfrm>
-          <a:prstGeom prst="straightConnector1">
-            <a:avLst/>
-          </a:prstGeom>
-          <a:ln w="15875">
-            <a:solidFill>
-              <a:schemeClr val="tx1"/>
-            </a:solidFill>
-            <a:headEnd type="stealth"/>
-            <a:tailEnd type="stealth" w="lg" len="med"/>
-          </a:ln>
-        </p:spPr>
-        <p:style>
-          <a:lnRef idx="1">
-            <a:schemeClr val="accent1"/>
-          </a:lnRef>
-          <a:fillRef idx="0">
-            <a:schemeClr val="accent1"/>
-          </a:fillRef>
-          <a:effectRef idx="0">
-            <a:schemeClr val="accent1"/>
-          </a:effectRef>
-          <a:fontRef idx="minor">
-            <a:schemeClr val="tx1"/>
-          </a:fontRef>
-        </p:style>
-      </p:cxnSp>
-      <p:graphicFrame>
-        <p:nvGraphicFramePr>
-          <p:cNvPr id="15387" name="Object 27"/>
-          <p:cNvGraphicFramePr>
-            <a:graphicFrameLocks noChangeAspect="1"/>
-          </p:cNvGraphicFramePr>
-          <p:nvPr/>
-        </p:nvGraphicFramePr>
-        <p:xfrm>
-          <a:off x="5335267" y="1981522"/>
-          <a:ext cx="236538" cy="327025"/>
-        </p:xfrm>
-        <a:graphic>
-          <a:graphicData uri="http://schemas.openxmlformats.org/presentationml/2006/ole">
-            <p:oleObj spid="_x0000_s15387" name="Equation" r:id="rId10" imgW="126720" imgH="177480" progId="Equation.DSMT4">
-              <p:embed/>
-            </p:oleObj>
-          </a:graphicData>
-        </a:graphic>
-      </p:graphicFrame>
-      <p:sp>
-        <p:nvSpPr>
-          <p:cNvPr id="158" name="TextBox 157"/>
-          <p:cNvSpPr txBox="1"/>
-          <p:nvPr/>
-        </p:nvSpPr>
-        <p:spPr>
-          <a:xfrm>
-            <a:off x="6204857" y="2136709"/>
-            <a:ext cx="1306286" cy="523220"/>
-          </a:xfrm>
-          <a:prstGeom prst="rect">
-            <a:avLst/>
-          </a:prstGeom>
-          <a:noFill/>
-        </p:spPr>
-        <p:txBody>
-          <a:bodyPr wrap="square" rtlCol="0">
-            <a:spAutoFit/>
-          </a:bodyPr>
-          <a:lstStyle/>
-          <a:p>
-            <a:r>
-              <a:rPr lang="en-US" sz="1400" dirty="0" smtClean="0">
-                <a:latin typeface="Garamond" pitchFamily="18" charset="0"/>
-              </a:rPr>
-              <a:t>Local tangent plane</a:t>
-            </a:r>
-            <a:endParaRPr lang="en-US" sz="1400" dirty="0">
-              <a:latin typeface="Garamond" pitchFamily="18" charset="0"/>
-            </a:endParaRPr>
-          </a:p>
-        </p:txBody>
-      </p:sp>
-      <p:cxnSp>
-        <p:nvCxnSpPr>
-          <p:cNvPr id="159" name="Straight Arrow Connector 158"/>
-          <p:cNvCxnSpPr>
-            <a:stCxn id="158" idx="1"/>
-          </p:cNvCxnSpPr>
-          <p:nvPr/>
-        </p:nvCxnSpPr>
-        <p:spPr>
-          <a:xfrm flipH="1">
-            <a:off x="5514393" y="2398319"/>
-            <a:ext cx="690464" cy="204922"/>
-          </a:xfrm>
-          <a:prstGeom prst="straightConnector1">
-            <a:avLst/>
-          </a:prstGeom>
-          <a:ln w="15875">
-            <a:solidFill>
-              <a:schemeClr val="tx1"/>
-            </a:solidFill>
-            <a:tailEnd type="stealth" w="lg" len="med"/>
-          </a:ln>
-        </p:spPr>
-        <p:style>
-          <a:lnRef idx="1">
-            <a:schemeClr val="accent1"/>
-          </a:lnRef>
-          <a:fillRef idx="0">
-            <a:schemeClr val="accent1"/>
-          </a:fillRef>
-          <a:effectRef idx="0">
-            <a:schemeClr val="accent1"/>
-          </a:effectRef>
-          <a:fontRef idx="minor">
-            <a:schemeClr val="tx1"/>
-          </a:fontRef>
-        </p:style>
-      </p:cxnSp>
-    </p:spTree>
-  </p:cSld>
-  <p:clrMapOvr>
-    <a:masterClrMapping/>
-  </p:clrMapOvr>
-  <p:timing>
-    <p:tnLst>
-      <p:par>
-        <p:cTn id="1" dur="indefinite" restart="never" nodeType="tmRoot"/>
-      </p:par>
-    </p:tnLst>
-  </p:timing>
-</p:sld>
-</file>
-
-<file path=ppt/slides/slide2.xml><?xml version="1.0" encoding="utf-8"?>
-<p:sld xmlns:a="http://schemas.openxmlformats.org/drawingml/2006/main" xmlns:r="http://schemas.openxmlformats.org/officeDocument/2006/relationships" xmlns:p="http://schemas.openxmlformats.org/presentationml/2006/main">
-  <p:cSld>
-    <p:spTree>
-      <p:nvGrpSpPr>
-        <p:cNvPr id="1" name=""/>
-        <p:cNvGrpSpPr/>
-        <p:nvPr/>
-      </p:nvGrpSpPr>
-      <p:grpSpPr>
-        <a:xfrm>
-          <a:off x="0" y="0"/>
-          <a:ext cx="0" cy="0"/>
-          <a:chOff x="0" y="0"/>
-          <a:chExt cx="0" cy="0"/>
-        </a:xfrm>
-      </p:grpSpPr>
-      <p:sp>
-        <p:nvSpPr>
-          <p:cNvPr id="157" name="Rectangle 156"/>
-          <p:cNvSpPr/>
-          <p:nvPr/>
-        </p:nvSpPr>
-        <p:spPr>
-          <a:xfrm rot="3418305">
-            <a:off x="5147555" y="2412717"/>
-            <a:ext cx="345383" cy="283109"/>
-          </a:xfrm>
-          <a:prstGeom prst="rect">
-            <a:avLst/>
-          </a:prstGeom>
-          <a:solidFill>
-            <a:schemeClr val="bg1">
-              <a:lumMod val="85000"/>
-              <a:alpha val="80000"/>
-            </a:schemeClr>
-          </a:solidFill>
-          <a:ln w="12700">
-            <a:solidFill>
-              <a:schemeClr val="tx1"/>
-            </a:solidFill>
-            <a:headEnd type="stealth"/>
-            <a:tailEnd type="none"/>
-          </a:ln>
-        </p:spPr>
-        <p:style>
-          <a:lnRef idx="1">
-            <a:schemeClr val="accent1"/>
-          </a:lnRef>
-          <a:fillRef idx="0">
-            <a:schemeClr val="accent1"/>
-          </a:fillRef>
-          <a:effectRef idx="0">
-            <a:schemeClr val="accent1"/>
-          </a:effectRef>
-          <a:fontRef idx="minor">
-            <a:schemeClr val="tx1"/>
-          </a:fontRef>
-        </p:style>
-        <p:txBody>
-          <a:bodyPr rtlCol="0" anchor="ctr"/>
-          <a:lstStyle/>
-          <a:p>
-            <a:pPr algn="ctr"/>
-            <a:endParaRPr lang="en-US">
-              <a:solidFill>
-                <a:schemeClr val="tx1"/>
-              </a:solidFill>
-            </a:endParaRPr>
-          </a:p>
-        </p:txBody>
-      </p:sp>
-      <p:sp>
-        <p:nvSpPr>
-          <p:cNvPr id="66" name="Arc 65"/>
-          <p:cNvSpPr/>
-          <p:nvPr/>
-        </p:nvSpPr>
-        <p:spPr>
-          <a:xfrm>
-            <a:off x="2827175" y="2771186"/>
-            <a:ext cx="3522013" cy="1315622"/>
-          </a:xfrm>
-          <a:prstGeom prst="arc">
-            <a:avLst>
-              <a:gd name="adj1" fmla="val 11486"/>
-              <a:gd name="adj2" fmla="val 10808031"/>
-            </a:avLst>
-          </a:prstGeom>
-          <a:solidFill>
-            <a:schemeClr val="bg1">
-              <a:lumMod val="85000"/>
-              <a:alpha val="49000"/>
-            </a:schemeClr>
-          </a:solidFill>
-          <a:ln w="19050">
-            <a:solidFill>
-              <a:schemeClr val="tx1"/>
-            </a:solidFill>
-          </a:ln>
-        </p:spPr>
-        <p:style>
-          <a:lnRef idx="1">
-            <a:schemeClr val="accent1"/>
-          </a:lnRef>
-          <a:fillRef idx="0">
-            <a:schemeClr val="accent1"/>
-          </a:fillRef>
-          <a:effectRef idx="0">
-            <a:schemeClr val="accent1"/>
-          </a:effectRef>
-          <a:fontRef idx="minor">
-            <a:schemeClr val="tx1"/>
-          </a:fontRef>
-        </p:style>
-        <p:txBody>
-          <a:bodyPr rtlCol="0" anchor="ctr"/>
-          <a:lstStyle/>
-          <a:p>
-            <a:pPr algn="ctr"/>
-            <a:endParaRPr lang="en-US"/>
-          </a:p>
-        </p:txBody>
-      </p:sp>
-      <p:sp>
-        <p:nvSpPr>
-          <p:cNvPr id="137" name="Arc 136"/>
-          <p:cNvSpPr/>
-          <p:nvPr/>
-        </p:nvSpPr>
-        <p:spPr>
-          <a:xfrm rot="10800000">
-            <a:off x="2820565" y="2792958"/>
-            <a:ext cx="3536302" cy="1315619"/>
-          </a:xfrm>
-          <a:prstGeom prst="arc">
-            <a:avLst>
-              <a:gd name="adj1" fmla="val 11355"/>
-              <a:gd name="adj2" fmla="val 10808031"/>
-            </a:avLst>
-          </a:prstGeom>
-          <a:solidFill>
-            <a:schemeClr val="bg1">
-              <a:lumMod val="85000"/>
-              <a:alpha val="49000"/>
-            </a:schemeClr>
-          </a:solidFill>
-          <a:ln w="19050">
-            <a:solidFill>
-              <a:schemeClr val="tx1"/>
-            </a:solidFill>
-            <a:prstDash val="dash"/>
-          </a:ln>
-        </p:spPr>
-        <p:style>
-          <a:lnRef idx="1">
-            <a:schemeClr val="accent1"/>
-          </a:lnRef>
-          <a:fillRef idx="0">
-            <a:schemeClr val="accent1"/>
-          </a:fillRef>
-          <a:effectRef idx="0">
-            <a:schemeClr val="accent1"/>
-          </a:effectRef>
-          <a:fontRef idx="minor">
-            <a:schemeClr val="tx1"/>
-          </a:fontRef>
-        </p:style>
-        <p:txBody>
-          <a:bodyPr rtlCol="0" anchor="ctr"/>
-          <a:lstStyle/>
-          <a:p>
-            <a:pPr algn="ctr"/>
-            <a:endParaRPr lang="en-US"/>
-          </a:p>
-        </p:txBody>
-      </p:sp>
-      <p:sp>
-        <p:nvSpPr>
-          <p:cNvPr id="43" name="Oval 42"/>
-          <p:cNvSpPr/>
-          <p:nvPr/>
-        </p:nvSpPr>
-        <p:spPr>
-          <a:xfrm>
-            <a:off x="2813374" y="1670374"/>
-            <a:ext cx="3536302" cy="3536302"/>
-          </a:xfrm>
-          <a:prstGeom prst="ellipse">
-            <a:avLst/>
-          </a:prstGeom>
-          <a:ln w="25400">
-            <a:solidFill>
-              <a:schemeClr val="tx1"/>
-            </a:solidFill>
-            <a:tailEnd type="stealth" w="lg" len="med"/>
-          </a:ln>
-        </p:spPr>
-        <p:style>
-          <a:lnRef idx="1">
-            <a:schemeClr val="accent1"/>
-          </a:lnRef>
-          <a:fillRef idx="0">
-            <a:schemeClr val="accent1"/>
-          </a:fillRef>
-          <a:effectRef idx="0">
-            <a:schemeClr val="accent1"/>
-          </a:effectRef>
-          <a:fontRef idx="minor">
-            <a:schemeClr val="tx1"/>
-          </a:fontRef>
-        </p:style>
-        <p:txBody>
-          <a:bodyPr rtlCol="0" anchor="ctr"/>
-          <a:lstStyle/>
-          <a:p>
-            <a:pPr algn="ctr"/>
-            <a:endParaRPr lang="en-US"/>
-          </a:p>
-        </p:txBody>
-      </p:sp>
-      <p:sp>
-        <p:nvSpPr>
-          <p:cNvPr id="81" name="TextBox 80"/>
-          <p:cNvSpPr txBox="1"/>
-          <p:nvPr/>
-        </p:nvSpPr>
-        <p:spPr>
-          <a:xfrm>
-            <a:off x="2313991" y="4749283"/>
-            <a:ext cx="961053" cy="523220"/>
-          </a:xfrm>
-          <a:prstGeom prst="rect">
-            <a:avLst/>
-          </a:prstGeom>
-          <a:noFill/>
-        </p:spPr>
-        <p:txBody>
-          <a:bodyPr wrap="square" rtlCol="0">
-            <a:spAutoFit/>
-          </a:bodyPr>
-          <a:lstStyle/>
-          <a:p>
-            <a:r>
-              <a:rPr lang="en-US" sz="1400" dirty="0" smtClean="0">
-                <a:latin typeface="Garamond" pitchFamily="18" charset="0"/>
-              </a:rPr>
-              <a:t>Greenwich meridian</a:t>
-            </a:r>
-            <a:endParaRPr lang="en-US" sz="1400" dirty="0">
-              <a:latin typeface="Garamond" pitchFamily="18" charset="0"/>
-            </a:endParaRPr>
-          </a:p>
-        </p:txBody>
-      </p:sp>
-      <p:sp>
-        <p:nvSpPr>
-          <p:cNvPr id="64" name="TextBox 63"/>
-          <p:cNvSpPr txBox="1"/>
-          <p:nvPr/>
-        </p:nvSpPr>
-        <p:spPr>
-          <a:xfrm>
-            <a:off x="6456784" y="3806889"/>
-            <a:ext cx="1362269" cy="307777"/>
-          </a:xfrm>
-          <a:prstGeom prst="rect">
-            <a:avLst/>
-          </a:prstGeom>
-          <a:noFill/>
-        </p:spPr>
-        <p:txBody>
-          <a:bodyPr wrap="square" rtlCol="0">
-            <a:spAutoFit/>
-          </a:bodyPr>
-          <a:lstStyle/>
-          <a:p>
-            <a:r>
-              <a:rPr lang="en-US" sz="1400" dirty="0" smtClean="0">
-                <a:latin typeface="Garamond" pitchFamily="18" charset="0"/>
-              </a:rPr>
-              <a:t>Equatorial plane</a:t>
-            </a:r>
-            <a:endParaRPr lang="en-US" sz="1400" dirty="0">
-              <a:latin typeface="Garamond" pitchFamily="18" charset="0"/>
-            </a:endParaRPr>
-          </a:p>
-        </p:txBody>
-      </p:sp>
-      <p:sp>
-        <p:nvSpPr>
-          <p:cNvPr id="95" name="Arc 94"/>
-          <p:cNvSpPr/>
-          <p:nvPr/>
-        </p:nvSpPr>
-        <p:spPr>
-          <a:xfrm rot="10800000">
-            <a:off x="4366726" y="1726163"/>
-            <a:ext cx="457202" cy="214604"/>
-          </a:xfrm>
-          <a:prstGeom prst="arc">
-            <a:avLst>
-              <a:gd name="adj1" fmla="val 11263464"/>
-              <a:gd name="adj2" fmla="val 10883140"/>
-            </a:avLst>
-          </a:prstGeom>
-          <a:ln w="12700">
-            <a:solidFill>
-              <a:schemeClr val="tx1"/>
-            </a:solidFill>
-            <a:prstDash val="solid"/>
-          </a:ln>
-        </p:spPr>
-        <p:style>
-          <a:lnRef idx="1">
-            <a:schemeClr val="accent1"/>
-          </a:lnRef>
-          <a:fillRef idx="0">
-            <a:schemeClr val="accent1"/>
-          </a:fillRef>
-          <a:effectRef idx="0">
-            <a:schemeClr val="accent1"/>
-          </a:effectRef>
-          <a:fontRef idx="minor">
-            <a:schemeClr val="tx1"/>
-          </a:fontRef>
-        </p:style>
-        <p:txBody>
-          <a:bodyPr rtlCol="0" anchor="ctr"/>
-          <a:lstStyle/>
-          <a:p>
-            <a:pPr algn="ctr"/>
-            <a:endParaRPr lang="en-US"/>
-          </a:p>
-        </p:txBody>
-      </p:sp>
-      <p:sp>
-        <p:nvSpPr>
-          <p:cNvPr id="100" name="Arc 99"/>
-          <p:cNvSpPr/>
-          <p:nvPr/>
-        </p:nvSpPr>
-        <p:spPr>
-          <a:xfrm rot="10800000">
-            <a:off x="4338733" y="1194318"/>
-            <a:ext cx="522516" cy="289250"/>
-          </a:xfrm>
-          <a:prstGeom prst="arc">
-            <a:avLst>
-              <a:gd name="adj1" fmla="val 9052599"/>
-              <a:gd name="adj2" fmla="val 1722148"/>
-            </a:avLst>
-          </a:prstGeom>
-          <a:ln w="15875">
-            <a:solidFill>
-              <a:schemeClr val="tx1"/>
-            </a:solidFill>
-            <a:prstDash val="sysDash"/>
-            <a:headEnd type="triangle"/>
-            <a:tailEnd type="none" w="lg" len="med"/>
-          </a:ln>
-        </p:spPr>
-        <p:style>
-          <a:lnRef idx="1">
-            <a:schemeClr val="accent1"/>
-          </a:lnRef>
-          <a:fillRef idx="0">
-            <a:schemeClr val="accent1"/>
-          </a:fillRef>
-          <a:effectRef idx="0">
-            <a:schemeClr val="accent1"/>
-          </a:effectRef>
-          <a:fontRef idx="minor">
-            <a:schemeClr val="tx1"/>
-          </a:fontRef>
-        </p:style>
-        <p:txBody>
-          <a:bodyPr rtlCol="0" anchor="ctr"/>
-          <a:lstStyle/>
-          <a:p>
-            <a:pPr algn="ctr"/>
-            <a:endParaRPr lang="en-US"/>
-          </a:p>
-        </p:txBody>
-      </p:sp>
-      <p:cxnSp>
-        <p:nvCxnSpPr>
-          <p:cNvPr id="104" name="Straight Arrow Connector 103"/>
-          <p:cNvCxnSpPr>
-            <a:stCxn id="64" idx="1"/>
-          </p:cNvCxnSpPr>
-          <p:nvPr/>
-        </p:nvCxnSpPr>
-        <p:spPr>
-          <a:xfrm flipH="1" flipV="1">
-            <a:off x="5822302" y="3732245"/>
-            <a:ext cx="634482" cy="228533"/>
-          </a:xfrm>
-          <a:prstGeom prst="straightConnector1">
-            <a:avLst/>
-          </a:prstGeom>
-          <a:ln w="15875">
-            <a:solidFill>
-              <a:schemeClr val="tx1"/>
-            </a:solidFill>
-            <a:tailEnd type="stealth" w="lg" len="med"/>
-          </a:ln>
-        </p:spPr>
-        <p:style>
-          <a:lnRef idx="1">
-            <a:schemeClr val="accent1"/>
-          </a:lnRef>
-          <a:fillRef idx="0">
-            <a:schemeClr val="accent1"/>
-          </a:fillRef>
-          <a:effectRef idx="0">
-            <a:schemeClr val="accent1"/>
-          </a:effectRef>
-          <a:fontRef idx="minor">
-            <a:schemeClr val="tx1"/>
-          </a:fontRef>
-        </p:style>
-      </p:cxnSp>
-      <p:sp>
-        <p:nvSpPr>
-          <p:cNvPr id="109" name="Oval 108"/>
-          <p:cNvSpPr/>
-          <p:nvPr/>
-        </p:nvSpPr>
-        <p:spPr>
-          <a:xfrm>
-            <a:off x="5273740" y="2494579"/>
-            <a:ext cx="90001" cy="90001"/>
-          </a:xfrm>
-          <a:prstGeom prst="ellipse">
-            <a:avLst/>
-          </a:prstGeom>
-          <a:solidFill>
-            <a:schemeClr val="tx1"/>
-          </a:solidFill>
-          <a:ln w="25400">
-            <a:solidFill>
-              <a:schemeClr val="tx1"/>
-            </a:solidFill>
-            <a:tailEnd type="stealth" w="lg" len="med"/>
-          </a:ln>
-        </p:spPr>
-        <p:style>
-          <a:lnRef idx="1">
-            <a:schemeClr val="accent1"/>
-          </a:lnRef>
-          <a:fillRef idx="0">
-            <a:schemeClr val="accent1"/>
-          </a:fillRef>
-          <a:effectRef idx="0">
-            <a:schemeClr val="accent1"/>
-          </a:effectRef>
-          <a:fontRef idx="minor">
-            <a:schemeClr val="tx1"/>
-          </a:fontRef>
-        </p:style>
-        <p:txBody>
-          <a:bodyPr rtlCol="0" anchor="ctr"/>
-          <a:lstStyle/>
-          <a:p>
-            <a:pPr algn="ctr"/>
-            <a:endParaRPr lang="en-US"/>
-          </a:p>
-        </p:txBody>
-      </p:sp>
-      <p:sp>
-        <p:nvSpPr>
-          <p:cNvPr id="122" name="Arc 121"/>
-          <p:cNvSpPr/>
-          <p:nvPr/>
-        </p:nvSpPr>
-        <p:spPr>
-          <a:xfrm>
-            <a:off x="3306147" y="2864497"/>
-            <a:ext cx="2572138" cy="1113450"/>
-          </a:xfrm>
-          <a:prstGeom prst="arc">
-            <a:avLst>
-              <a:gd name="adj1" fmla="val 1557383"/>
-              <a:gd name="adj2" fmla="val 8982820"/>
-            </a:avLst>
-          </a:prstGeom>
-          <a:ln w="12700">
-            <a:solidFill>
-              <a:schemeClr val="tx1"/>
-            </a:solidFill>
-            <a:headEnd type="stealth"/>
-            <a:tailEnd type="none"/>
-          </a:ln>
-        </p:spPr>
-        <p:style>
-          <a:lnRef idx="1">
-            <a:schemeClr val="accent1"/>
-          </a:lnRef>
-          <a:fillRef idx="0">
-            <a:schemeClr val="accent1"/>
-          </a:fillRef>
-          <a:effectRef idx="0">
-            <a:schemeClr val="accent1"/>
-          </a:effectRef>
-          <a:fontRef idx="minor">
-            <a:schemeClr val="tx1"/>
-          </a:fontRef>
-        </p:style>
-        <p:txBody>
-          <a:bodyPr rtlCol="0" anchor="ctr"/>
-          <a:lstStyle/>
-          <a:p>
-            <a:pPr algn="ctr"/>
-            <a:endParaRPr lang="en-US"/>
-          </a:p>
-        </p:txBody>
-      </p:sp>
-      <p:graphicFrame>
-        <p:nvGraphicFramePr>
-          <p:cNvPr id="15382" name="Object 22"/>
-          <p:cNvGraphicFramePr>
-            <a:graphicFrameLocks noChangeAspect="1"/>
-          </p:cNvGraphicFramePr>
-          <p:nvPr/>
-        </p:nvGraphicFramePr>
-        <p:xfrm>
-          <a:off x="4849813" y="1082675"/>
-          <a:ext cx="377825" cy="446088"/>
-        </p:xfrm>
-        <a:graphic>
-          <a:graphicData uri="http://schemas.openxmlformats.org/presentationml/2006/ole">
-            <p:oleObj spid="_x0000_s28676" name="Equation" r:id="rId3" imgW="203040" imgH="241200" progId="Equation.DSMT4">
+            <p:oleObj spid="_x0000_s1033" name="Equation" r:id="rId8" imgW="164880" imgH="228600" progId="Equation.DSMT4">
               <p:embed/>
             </p:oleObj>
           </a:graphicData>
@@ -4899,910 +3660,125 @@
       </p:graphicFrame>
       <p:graphicFrame>
         <p:nvGraphicFramePr>
-          <p:cNvPr id="15383" name="Object 23"/>
+          <p:cNvPr id="1034" name="Object 2"/>
           <p:cNvGraphicFramePr>
             <a:graphicFrameLocks noChangeAspect="1"/>
           </p:cNvGraphicFramePr>
           <p:nvPr/>
         </p:nvGraphicFramePr>
         <p:xfrm>
-          <a:off x="2411380" y="4397084"/>
-          <a:ext cx="306388" cy="422275"/>
+          <a:off x="5037138" y="3489325"/>
+          <a:ext cx="211137" cy="193675"/>
         </p:xfrm>
         <a:graphic>
           <a:graphicData uri="http://schemas.openxmlformats.org/presentationml/2006/ole">
-            <p:oleObj spid="_x0000_s28677" name="Equation" r:id="rId4" imgW="164880" imgH="228600" progId="Equation.DSMT4">
+            <p:oleObj spid="_x0000_s1034" name="Equation" r:id="rId9" imgW="152280" imgH="139680" progId="Equation.DSMT4">
               <p:embed/>
             </p:oleObj>
           </a:graphicData>
         </a:graphic>
       </p:graphicFrame>
+      <p:sp>
+        <p:nvSpPr>
+          <p:cNvPr id="37" name="Text Box 46"/>
+          <p:cNvSpPr txBox="1">
+            <a:spLocks noChangeArrowheads="1"/>
+          </p:cNvSpPr>
+          <p:nvPr/>
+        </p:nvSpPr>
+        <p:spPr bwMode="auto">
+          <a:xfrm>
+            <a:off x="3962400" y="2054423"/>
+            <a:ext cx="942887" cy="307777"/>
+          </a:xfrm>
+          <a:prstGeom prst="rect">
+            <a:avLst/>
+          </a:prstGeom>
+          <a:noFill/>
+          <a:ln w="9525">
+            <a:noFill/>
+            <a:miter lim="800000"/>
+            <a:headEnd/>
+            <a:tailEnd/>
+          </a:ln>
+          <a:effectLst/>
+        </p:spPr>
+        <p:txBody>
+          <a:bodyPr wrap="none">
+            <a:spAutoFit/>
+          </a:bodyPr>
+          <a:lstStyle/>
+          <a:p>
+            <a:r>
+              <a:rPr lang="en-US" sz="1400" dirty="0" smtClean="0">
+                <a:latin typeface="Garamond" pitchFamily="18" charset="0"/>
+              </a:rPr>
+              <a:t>Rigid body</a:t>
+            </a:r>
+            <a:endParaRPr lang="en-US" sz="1400" dirty="0">
+              <a:latin typeface="Garamond" pitchFamily="18" charset="0"/>
+            </a:endParaRPr>
+          </a:p>
+        </p:txBody>
+      </p:sp>
+      <p:sp>
+        <p:nvSpPr>
+          <p:cNvPr id="39" name="Text Box 69"/>
+          <p:cNvSpPr txBox="1">
+            <a:spLocks noChangeArrowheads="1"/>
+          </p:cNvSpPr>
+          <p:nvPr/>
+        </p:nvSpPr>
+        <p:spPr bwMode="auto">
+          <a:xfrm>
+            <a:off x="3134847" y="3855771"/>
+            <a:ext cx="327334" cy="307777"/>
+          </a:xfrm>
+          <a:prstGeom prst="rect">
+            <a:avLst/>
+          </a:prstGeom>
+          <a:noFill/>
+          <a:ln w="9525">
+            <a:noFill/>
+            <a:miter lim="800000"/>
+            <a:headEnd/>
+            <a:tailEnd/>
+          </a:ln>
+          <a:effectLst/>
+        </p:spPr>
+        <p:txBody>
+          <a:bodyPr wrap="none">
+            <a:spAutoFit/>
+          </a:bodyPr>
+          <a:lstStyle/>
+          <a:p>
+            <a:r>
+              <a:rPr lang="en-US" sz="1400" b="1" i="1" dirty="0" smtClean="0">
+                <a:latin typeface="Garamond" pitchFamily="18" charset="0"/>
+              </a:rPr>
+              <a:t>O</a:t>
+            </a:r>
+            <a:endParaRPr lang="en-US" sz="1400" b="1" i="1" dirty="0">
+              <a:latin typeface="Garamond" pitchFamily="18" charset="0"/>
+            </a:endParaRPr>
+          </a:p>
+        </p:txBody>
+      </p:sp>
       <p:graphicFrame>
         <p:nvGraphicFramePr>
-          <p:cNvPr id="15384" name="Object 24"/>
+          <p:cNvPr id="1036" name="Object 12"/>
           <p:cNvGraphicFramePr>
             <a:graphicFrameLocks noChangeAspect="1"/>
           </p:cNvGraphicFramePr>
           <p:nvPr/>
         </p:nvGraphicFramePr>
         <p:xfrm>
-          <a:off x="7283450" y="3233738"/>
-          <a:ext cx="330200" cy="422275"/>
+          <a:off x="4433175" y="2791182"/>
+          <a:ext cx="157162" cy="176212"/>
         </p:xfrm>
         <a:graphic>
           <a:graphicData uri="http://schemas.openxmlformats.org/presentationml/2006/ole">
-            <p:oleObj spid="_x0000_s28678" name="Equation" r:id="rId5" imgW="177480" imgH="228600" progId="Equation.DSMT4">
-              <p:embed/>
-            </p:oleObj>
-          </a:graphicData>
-        </a:graphic>
-      </p:graphicFrame>
-      <p:graphicFrame>
-        <p:nvGraphicFramePr>
-          <p:cNvPr id="15385" name="Object 25"/>
-          <p:cNvGraphicFramePr>
-            <a:graphicFrameLocks noChangeAspect="1"/>
-          </p:cNvGraphicFramePr>
-          <p:nvPr/>
-        </p:nvGraphicFramePr>
-        <p:xfrm>
-          <a:off x="3916363" y="830263"/>
-          <a:ext cx="587375" cy="422275"/>
-        </p:xfrm>
-        <a:graphic>
-          <a:graphicData uri="http://schemas.openxmlformats.org/presentationml/2006/ole">
-            <p:oleObj spid="_x0000_s28679" name="Equation" r:id="rId6" imgW="317160" imgH="228600" progId="Equation.DSMT4">
-              <p:embed/>
-            </p:oleObj>
-          </a:graphicData>
-        </a:graphic>
-      </p:graphicFrame>
-      <p:graphicFrame>
-        <p:nvGraphicFramePr>
-          <p:cNvPr id="15386" name="Object 26"/>
-          <p:cNvGraphicFramePr>
-            <a:graphicFrameLocks noChangeAspect="1"/>
-          </p:cNvGraphicFramePr>
-          <p:nvPr/>
-        </p:nvGraphicFramePr>
-        <p:xfrm>
-          <a:off x="6006751" y="1595535"/>
-          <a:ext cx="980466" cy="337392"/>
-        </p:xfrm>
-        <a:graphic>
-          <a:graphicData uri="http://schemas.openxmlformats.org/presentationml/2006/ole">
-            <p:oleObj spid="_x0000_s28680" name="Equation" r:id="rId7" imgW="660240" imgH="228600" progId="Equation.DSMT4">
-              <p:embed/>
-            </p:oleObj>
-          </a:graphicData>
-        </a:graphic>
-      </p:graphicFrame>
-      <p:cxnSp>
-        <p:nvCxnSpPr>
-          <p:cNvPr id="41" name="Straight Arrow Connector 40"/>
-          <p:cNvCxnSpPr/>
-          <p:nvPr/>
-        </p:nvCxnSpPr>
-        <p:spPr>
-          <a:xfrm flipV="1">
-            <a:off x="4572617" y="3424335"/>
-            <a:ext cx="2695930" cy="5479"/>
-          </a:xfrm>
-          <a:prstGeom prst="straightConnector1">
-            <a:avLst/>
-          </a:prstGeom>
-          <a:ln w="15875">
-            <a:solidFill>
-              <a:schemeClr val="tx1"/>
-            </a:solidFill>
-            <a:tailEnd type="stealth" w="lg" len="med"/>
-          </a:ln>
-        </p:spPr>
-        <p:style>
-          <a:lnRef idx="1">
-            <a:schemeClr val="accent1"/>
-          </a:lnRef>
-          <a:fillRef idx="0">
-            <a:schemeClr val="accent1"/>
-          </a:fillRef>
-          <a:effectRef idx="0">
-            <a:schemeClr val="accent1"/>
-          </a:effectRef>
-          <a:fontRef idx="minor">
-            <a:schemeClr val="tx1"/>
-          </a:fontRef>
-        </p:style>
-      </p:cxnSp>
-      <p:cxnSp>
-        <p:nvCxnSpPr>
-          <p:cNvPr id="71" name="Straight Arrow Connector 70"/>
-          <p:cNvCxnSpPr/>
-          <p:nvPr/>
-        </p:nvCxnSpPr>
-        <p:spPr>
-          <a:xfrm flipH="1">
-            <a:off x="2724539" y="3442994"/>
-            <a:ext cx="1833561" cy="1017039"/>
-          </a:xfrm>
-          <a:prstGeom prst="straightConnector1">
-            <a:avLst/>
-          </a:prstGeom>
-          <a:ln w="15875">
-            <a:solidFill>
-              <a:schemeClr val="tx1"/>
-            </a:solidFill>
-            <a:tailEnd type="stealth" w="lg" len="med"/>
-          </a:ln>
-        </p:spPr>
-        <p:style>
-          <a:lnRef idx="1">
-            <a:schemeClr val="accent1"/>
-          </a:lnRef>
-          <a:fillRef idx="0">
-            <a:schemeClr val="accent1"/>
-          </a:fillRef>
-          <a:effectRef idx="0">
-            <a:schemeClr val="accent1"/>
-          </a:effectRef>
-          <a:fontRef idx="minor">
-            <a:schemeClr val="tx1"/>
-          </a:fontRef>
-        </p:style>
-      </p:cxnSp>
-      <p:sp>
-        <p:nvSpPr>
-          <p:cNvPr id="70" name="Arc 69"/>
-          <p:cNvSpPr/>
-          <p:nvPr/>
-        </p:nvSpPr>
-        <p:spPr>
-          <a:xfrm rot="6251086">
-            <a:off x="2840016" y="2474022"/>
-            <a:ext cx="3541615" cy="1931205"/>
-          </a:xfrm>
-          <a:prstGeom prst="arc">
-            <a:avLst>
-              <a:gd name="adj1" fmla="val 8293"/>
-              <a:gd name="adj2" fmla="val 10742641"/>
-            </a:avLst>
-          </a:prstGeom>
-          <a:ln w="15875">
-            <a:solidFill>
-              <a:schemeClr val="tx1"/>
-            </a:solidFill>
-          </a:ln>
-        </p:spPr>
-        <p:style>
-          <a:lnRef idx="1">
-            <a:schemeClr val="accent1"/>
-          </a:lnRef>
-          <a:fillRef idx="0">
-            <a:schemeClr val="accent1"/>
-          </a:fillRef>
-          <a:effectRef idx="0">
-            <a:schemeClr val="accent1"/>
-          </a:effectRef>
-          <a:fontRef idx="minor">
-            <a:schemeClr val="tx1"/>
-          </a:fontRef>
-        </p:style>
-        <p:txBody>
-          <a:bodyPr rtlCol="0" anchor="ctr"/>
-          <a:lstStyle/>
-          <a:p>
-            <a:pPr algn="ctr"/>
-            <a:endParaRPr lang="en-US"/>
-          </a:p>
-        </p:txBody>
-      </p:sp>
-      <p:sp>
-        <p:nvSpPr>
-          <p:cNvPr id="103" name="Arc 102"/>
-          <p:cNvSpPr/>
-          <p:nvPr/>
-        </p:nvSpPr>
-        <p:spPr>
-          <a:xfrm rot="15150085">
-            <a:off x="2908894" y="2468226"/>
-            <a:ext cx="3514017" cy="1891789"/>
-          </a:xfrm>
-          <a:prstGeom prst="arc">
-            <a:avLst>
-              <a:gd name="adj1" fmla="val 42011"/>
-              <a:gd name="adj2" fmla="val 10761422"/>
-            </a:avLst>
-          </a:prstGeom>
-          <a:ln w="15875">
-            <a:solidFill>
-              <a:schemeClr val="tx1"/>
-            </a:solidFill>
-          </a:ln>
-        </p:spPr>
-        <p:style>
-          <a:lnRef idx="1">
-            <a:schemeClr val="accent1"/>
-          </a:lnRef>
-          <a:fillRef idx="0">
-            <a:schemeClr val="accent1"/>
-          </a:fillRef>
-          <a:effectRef idx="0">
-            <a:schemeClr val="accent1"/>
-          </a:effectRef>
-          <a:fontRef idx="minor">
-            <a:schemeClr val="tx1"/>
-          </a:fontRef>
-        </p:style>
-        <p:txBody>
-          <a:bodyPr rtlCol="0" anchor="ctr"/>
-          <a:lstStyle/>
-          <a:p>
-            <a:pPr algn="ctr"/>
-            <a:endParaRPr lang="en-US"/>
-          </a:p>
-        </p:txBody>
-      </p:sp>
-      <p:cxnSp>
-        <p:nvCxnSpPr>
-          <p:cNvPr id="110" name="Straight Arrow Connector 109"/>
-          <p:cNvCxnSpPr>
-            <a:endCxn id="109" idx="3"/>
-          </p:cNvCxnSpPr>
-          <p:nvPr/>
-        </p:nvCxnSpPr>
-        <p:spPr>
-          <a:xfrm flipV="1">
-            <a:off x="4572000" y="2571400"/>
-            <a:ext cx="714920" cy="852936"/>
-          </a:xfrm>
-          <a:prstGeom prst="straightConnector1">
-            <a:avLst/>
-          </a:prstGeom>
-          <a:ln w="15875">
-            <a:solidFill>
-              <a:schemeClr val="tx1"/>
-            </a:solidFill>
-            <a:tailEnd type="none" w="lg" len="med"/>
-          </a:ln>
-        </p:spPr>
-        <p:style>
-          <a:lnRef idx="1">
-            <a:schemeClr val="accent1"/>
-          </a:lnRef>
-          <a:fillRef idx="0">
-            <a:schemeClr val="accent1"/>
-          </a:fillRef>
-          <a:effectRef idx="0">
-            <a:schemeClr val="accent1"/>
-          </a:effectRef>
-          <a:fontRef idx="minor">
-            <a:schemeClr val="tx1"/>
-          </a:fontRef>
-        </p:style>
-      </p:cxnSp>
-      <p:cxnSp>
-        <p:nvCxnSpPr>
-          <p:cNvPr id="114" name="Straight Arrow Connector 113"/>
-          <p:cNvCxnSpPr/>
-          <p:nvPr/>
-        </p:nvCxnSpPr>
-        <p:spPr>
-          <a:xfrm>
-            <a:off x="4581331" y="3424336"/>
-            <a:ext cx="1110342" cy="513182"/>
-          </a:xfrm>
-          <a:prstGeom prst="straightConnector1">
-            <a:avLst/>
-          </a:prstGeom>
-          <a:ln w="15875">
-            <a:solidFill>
-              <a:schemeClr val="tx1"/>
-            </a:solidFill>
-            <a:prstDash val="dash"/>
-            <a:tailEnd type="none" w="lg" len="med"/>
-          </a:ln>
-        </p:spPr>
-        <p:style>
-          <a:lnRef idx="1">
-            <a:schemeClr val="accent1"/>
-          </a:lnRef>
-          <a:fillRef idx="0">
-            <a:schemeClr val="accent1"/>
-          </a:fillRef>
-          <a:effectRef idx="0">
-            <a:schemeClr val="accent1"/>
-          </a:effectRef>
-          <a:fontRef idx="minor">
-            <a:schemeClr val="tx1"/>
-          </a:fontRef>
-        </p:style>
-      </p:cxnSp>
-      <p:graphicFrame>
-        <p:nvGraphicFramePr>
-          <p:cNvPr id="123" name="Object 122"/>
-          <p:cNvGraphicFramePr>
-            <a:graphicFrameLocks noChangeAspect="1"/>
-          </p:cNvGraphicFramePr>
-          <p:nvPr/>
-        </p:nvGraphicFramePr>
-        <p:xfrm>
-          <a:off x="4425950" y="3673340"/>
-          <a:ext cx="258018" cy="328387"/>
-        </p:xfrm>
-        <a:graphic>
-          <a:graphicData uri="http://schemas.openxmlformats.org/presentationml/2006/ole">
-            <p:oleObj spid="_x0000_s28674" name="Equation" r:id="rId8" imgW="139680" imgH="177480" progId="Equation.DSMT4">
-              <p:embed/>
-            </p:oleObj>
-          </a:graphicData>
-        </a:graphic>
-      </p:graphicFrame>
-      <p:graphicFrame>
-        <p:nvGraphicFramePr>
-          <p:cNvPr id="15381" name="Object 21"/>
-          <p:cNvGraphicFramePr>
-            <a:graphicFrameLocks noChangeAspect="1"/>
-          </p:cNvGraphicFramePr>
-          <p:nvPr/>
-        </p:nvGraphicFramePr>
-        <p:xfrm>
-          <a:off x="4961423" y="3044046"/>
-          <a:ext cx="258763" cy="304800"/>
-        </p:xfrm>
-        <a:graphic>
-          <a:graphicData uri="http://schemas.openxmlformats.org/presentationml/2006/ole">
-            <p:oleObj spid="_x0000_s28675" name="Equation" r:id="rId9" imgW="139680" imgH="164880" progId="Equation.DSMT4">
-              <p:embed/>
-            </p:oleObj>
-          </a:graphicData>
-        </a:graphic>
-      </p:graphicFrame>
-      <p:cxnSp>
-        <p:nvCxnSpPr>
-          <p:cNvPr id="40" name="Straight Arrow Connector 39"/>
-          <p:cNvCxnSpPr/>
-          <p:nvPr/>
-        </p:nvCxnSpPr>
-        <p:spPr>
-          <a:xfrm flipV="1">
-            <a:off x="4581948" y="933062"/>
-            <a:ext cx="8714" cy="2506082"/>
-          </a:xfrm>
-          <a:prstGeom prst="straightConnector1">
-            <a:avLst/>
-          </a:prstGeom>
-          <a:ln w="15875">
-            <a:solidFill>
-              <a:schemeClr val="tx1"/>
-            </a:solidFill>
-            <a:tailEnd type="stealth" w="lg" len="med"/>
-          </a:ln>
-        </p:spPr>
-        <p:style>
-          <a:lnRef idx="1">
-            <a:schemeClr val="accent1"/>
-          </a:lnRef>
-          <a:fillRef idx="0">
-            <a:schemeClr val="accent1"/>
-          </a:fillRef>
-          <a:effectRef idx="0">
-            <a:schemeClr val="accent1"/>
-          </a:effectRef>
-          <a:fontRef idx="minor">
-            <a:schemeClr val="tx1"/>
-          </a:fontRef>
-        </p:style>
-      </p:cxnSp>
-      <p:sp>
-        <p:nvSpPr>
-          <p:cNvPr id="124" name="Arc 123"/>
-          <p:cNvSpPr/>
-          <p:nvPr/>
-        </p:nvSpPr>
-        <p:spPr>
-          <a:xfrm rot="16017324">
-            <a:off x="3390715" y="3304997"/>
-            <a:ext cx="2738910" cy="1408107"/>
-          </a:xfrm>
-          <a:prstGeom prst="arc">
-            <a:avLst>
-              <a:gd name="adj1" fmla="val 1092140"/>
-              <a:gd name="adj2" fmla="val 4601547"/>
-            </a:avLst>
-          </a:prstGeom>
-          <a:ln w="12700">
-            <a:solidFill>
-              <a:schemeClr val="tx1"/>
-            </a:solidFill>
-            <a:headEnd type="stealth"/>
-            <a:tailEnd type="none"/>
-          </a:ln>
-        </p:spPr>
-        <p:style>
-          <a:lnRef idx="1">
-            <a:schemeClr val="accent1"/>
-          </a:lnRef>
-          <a:fillRef idx="0">
-            <a:schemeClr val="accent1"/>
-          </a:fillRef>
-          <a:effectRef idx="0">
-            <a:schemeClr val="accent1"/>
-          </a:effectRef>
-          <a:fontRef idx="minor">
-            <a:schemeClr val="tx1"/>
-          </a:fontRef>
-        </p:style>
-        <p:txBody>
-          <a:bodyPr rtlCol="0" anchor="ctr"/>
-          <a:lstStyle/>
-          <a:p>
-            <a:pPr algn="ctr"/>
-            <a:endParaRPr lang="en-US"/>
-          </a:p>
-        </p:txBody>
-      </p:sp>
-      <p:sp>
-        <p:nvSpPr>
-          <p:cNvPr id="141" name="Arc 140"/>
-          <p:cNvSpPr/>
-          <p:nvPr/>
-        </p:nvSpPr>
-        <p:spPr>
-          <a:xfrm rot="6251086">
-            <a:off x="2843120" y="2477126"/>
-            <a:ext cx="3541615" cy="1931205"/>
-          </a:xfrm>
-          <a:prstGeom prst="arc">
-            <a:avLst>
-              <a:gd name="adj1" fmla="val 19984343"/>
-              <a:gd name="adj2" fmla="val 602459"/>
-            </a:avLst>
-          </a:prstGeom>
-          <a:ln w="15875">
-            <a:solidFill>
-              <a:schemeClr val="tx1"/>
-            </a:solidFill>
-            <a:prstDash val="dash"/>
-          </a:ln>
-        </p:spPr>
-        <p:style>
-          <a:lnRef idx="1">
-            <a:schemeClr val="accent1"/>
-          </a:lnRef>
-          <a:fillRef idx="0">
-            <a:schemeClr val="accent1"/>
-          </a:fillRef>
-          <a:effectRef idx="0">
-            <a:schemeClr val="accent1"/>
-          </a:effectRef>
-          <a:fontRef idx="minor">
-            <a:schemeClr val="tx1"/>
-          </a:fontRef>
-        </p:style>
-        <p:txBody>
-          <a:bodyPr rtlCol="0" anchor="ctr"/>
-          <a:lstStyle/>
-          <a:p>
-            <a:pPr algn="ctr"/>
-            <a:endParaRPr lang="en-US"/>
-          </a:p>
-        </p:txBody>
-      </p:sp>
-      <p:sp>
-        <p:nvSpPr>
-          <p:cNvPr id="146" name="Oval 145"/>
-          <p:cNvSpPr/>
-          <p:nvPr/>
-        </p:nvSpPr>
-        <p:spPr>
-          <a:xfrm>
-            <a:off x="3541278" y="3915995"/>
-            <a:ext cx="90001" cy="90001"/>
-          </a:xfrm>
-          <a:prstGeom prst="ellipse">
-            <a:avLst/>
-          </a:prstGeom>
-          <a:solidFill>
-            <a:schemeClr val="tx1"/>
-          </a:solidFill>
-          <a:ln w="25400">
-            <a:solidFill>
-              <a:schemeClr val="tx1"/>
-            </a:solidFill>
-            <a:tailEnd type="stealth" w="lg" len="med"/>
-          </a:ln>
-        </p:spPr>
-        <p:style>
-          <a:lnRef idx="1">
-            <a:schemeClr val="accent1"/>
-          </a:lnRef>
-          <a:fillRef idx="0">
-            <a:schemeClr val="accent1"/>
-          </a:fillRef>
-          <a:effectRef idx="0">
-            <a:schemeClr val="accent1"/>
-          </a:effectRef>
-          <a:fontRef idx="minor">
-            <a:schemeClr val="tx1"/>
-          </a:fontRef>
-        </p:style>
-        <p:txBody>
-          <a:bodyPr rtlCol="0" anchor="ctr"/>
-          <a:lstStyle/>
-          <a:p>
-            <a:pPr algn="ctr"/>
-            <a:endParaRPr lang="en-US"/>
-          </a:p>
-        </p:txBody>
-      </p:sp>
-      <p:sp>
-        <p:nvSpPr>
-          <p:cNvPr id="147" name="Oval 146"/>
-          <p:cNvSpPr/>
-          <p:nvPr/>
-        </p:nvSpPr>
-        <p:spPr>
-          <a:xfrm>
-            <a:off x="4542764" y="1745072"/>
-            <a:ext cx="90001" cy="90001"/>
-          </a:xfrm>
-          <a:prstGeom prst="ellipse">
-            <a:avLst/>
-          </a:prstGeom>
-          <a:solidFill>
-            <a:schemeClr val="tx1"/>
-          </a:solidFill>
-          <a:ln w="25400">
-            <a:solidFill>
-              <a:schemeClr val="tx1"/>
-            </a:solidFill>
-            <a:tailEnd type="stealth" w="lg" len="med"/>
-          </a:ln>
-        </p:spPr>
-        <p:style>
-          <a:lnRef idx="1">
-            <a:schemeClr val="accent1"/>
-          </a:lnRef>
-          <a:fillRef idx="0">
-            <a:schemeClr val="accent1"/>
-          </a:fillRef>
-          <a:effectRef idx="0">
-            <a:schemeClr val="accent1"/>
-          </a:effectRef>
-          <a:fontRef idx="minor">
-            <a:schemeClr val="tx1"/>
-          </a:fontRef>
-        </p:style>
-        <p:txBody>
-          <a:bodyPr rtlCol="0" anchor="ctr"/>
-          <a:lstStyle/>
-          <a:p>
-            <a:pPr algn="ctr"/>
-            <a:endParaRPr lang="en-US"/>
-          </a:p>
-        </p:txBody>
-      </p:sp>
-      <p:sp>
-        <p:nvSpPr>
-          <p:cNvPr id="148" name="Oval 147"/>
-          <p:cNvSpPr/>
-          <p:nvPr/>
-        </p:nvSpPr>
-        <p:spPr>
-          <a:xfrm>
-            <a:off x="5867804" y="1763643"/>
-            <a:ext cx="90001" cy="90001"/>
-          </a:xfrm>
-          <a:prstGeom prst="ellipse">
-            <a:avLst/>
-          </a:prstGeom>
-          <a:solidFill>
-            <a:schemeClr val="tx1"/>
-          </a:solidFill>
-          <a:ln w="25400">
-            <a:solidFill>
-              <a:schemeClr val="tx1"/>
-            </a:solidFill>
-            <a:tailEnd type="stealth" w="lg" len="med"/>
-          </a:ln>
-        </p:spPr>
-        <p:style>
-          <a:lnRef idx="1">
-            <a:schemeClr val="accent1"/>
-          </a:lnRef>
-          <a:fillRef idx="0">
-            <a:schemeClr val="accent1"/>
-          </a:fillRef>
-          <a:effectRef idx="0">
-            <a:schemeClr val="accent1"/>
-          </a:effectRef>
-          <a:fontRef idx="minor">
-            <a:schemeClr val="tx1"/>
-          </a:fontRef>
-        </p:style>
-        <p:txBody>
-          <a:bodyPr rtlCol="0" anchor="ctr"/>
-          <a:lstStyle/>
-          <a:p>
-            <a:pPr algn="ctr"/>
-            <a:endParaRPr lang="en-US"/>
-          </a:p>
-        </p:txBody>
-      </p:sp>
-      <p:cxnSp>
-        <p:nvCxnSpPr>
-          <p:cNvPr id="151" name="Straight Arrow Connector 150"/>
-          <p:cNvCxnSpPr>
-            <a:stCxn id="109" idx="7"/>
-            <a:endCxn id="148" idx="3"/>
-          </p:cNvCxnSpPr>
-          <p:nvPr/>
-        </p:nvCxnSpPr>
-        <p:spPr>
-          <a:xfrm flipV="1">
-            <a:off x="5350561" y="1840464"/>
-            <a:ext cx="530423" cy="667295"/>
-          </a:xfrm>
-          <a:prstGeom prst="straightConnector1">
-            <a:avLst/>
-          </a:prstGeom>
-          <a:ln w="15875">
-            <a:solidFill>
-              <a:schemeClr val="tx1"/>
-            </a:solidFill>
-            <a:headEnd type="stealth"/>
-            <a:tailEnd type="stealth" w="lg" len="med"/>
-          </a:ln>
-        </p:spPr>
-        <p:style>
-          <a:lnRef idx="1">
-            <a:schemeClr val="accent1"/>
-          </a:lnRef>
-          <a:fillRef idx="0">
-            <a:schemeClr val="accent1"/>
-          </a:fillRef>
-          <a:effectRef idx="0">
-            <a:schemeClr val="accent1"/>
-          </a:effectRef>
-          <a:fontRef idx="minor">
-            <a:schemeClr val="tx1"/>
-          </a:fontRef>
-        </p:style>
-      </p:cxnSp>
-      <p:graphicFrame>
-        <p:nvGraphicFramePr>
-          <p:cNvPr id="15387" name="Object 27"/>
-          <p:cNvGraphicFramePr>
-            <a:graphicFrameLocks noChangeAspect="1"/>
-          </p:cNvGraphicFramePr>
-          <p:nvPr/>
-        </p:nvGraphicFramePr>
-        <p:xfrm>
-          <a:off x="5335267" y="1981522"/>
-          <a:ext cx="236538" cy="327025"/>
-        </p:xfrm>
-        <a:graphic>
-          <a:graphicData uri="http://schemas.openxmlformats.org/presentationml/2006/ole">
-            <p:oleObj spid="_x0000_s28681" name="Equation" r:id="rId10" imgW="126720" imgH="177480" progId="Equation.DSMT4">
-              <p:embed/>
-            </p:oleObj>
-          </a:graphicData>
-        </a:graphic>
-      </p:graphicFrame>
-      <p:sp>
-        <p:nvSpPr>
-          <p:cNvPr id="158" name="TextBox 157"/>
-          <p:cNvSpPr txBox="1"/>
-          <p:nvPr/>
-        </p:nvSpPr>
-        <p:spPr>
-          <a:xfrm>
-            <a:off x="6204857" y="2136709"/>
-            <a:ext cx="1306286" cy="523220"/>
-          </a:xfrm>
-          <a:prstGeom prst="rect">
-            <a:avLst/>
-          </a:prstGeom>
-          <a:noFill/>
-        </p:spPr>
-        <p:txBody>
-          <a:bodyPr wrap="square" rtlCol="0">
-            <a:spAutoFit/>
-          </a:bodyPr>
-          <a:lstStyle/>
-          <a:p>
-            <a:r>
-              <a:rPr lang="en-US" sz="1400" dirty="0" smtClean="0">
-                <a:latin typeface="Garamond" pitchFamily="18" charset="0"/>
-              </a:rPr>
-              <a:t>Local tangent plane</a:t>
-            </a:r>
-            <a:endParaRPr lang="en-US" sz="1400" dirty="0">
-              <a:latin typeface="Garamond" pitchFamily="18" charset="0"/>
-            </a:endParaRPr>
-          </a:p>
-        </p:txBody>
-      </p:sp>
-      <p:cxnSp>
-        <p:nvCxnSpPr>
-          <p:cNvPr id="159" name="Straight Arrow Connector 158"/>
-          <p:cNvCxnSpPr>
-            <a:stCxn id="158" idx="1"/>
-          </p:cNvCxnSpPr>
-          <p:nvPr/>
-        </p:nvCxnSpPr>
-        <p:spPr>
-          <a:xfrm flipH="1">
-            <a:off x="5514393" y="2398319"/>
-            <a:ext cx="690464" cy="204922"/>
-          </a:xfrm>
-          <a:prstGeom prst="straightConnector1">
-            <a:avLst/>
-          </a:prstGeom>
-          <a:ln w="15875">
-            <a:solidFill>
-              <a:schemeClr val="tx1"/>
-            </a:solidFill>
-            <a:tailEnd type="stealth" w="lg" len="med"/>
-          </a:ln>
-        </p:spPr>
-        <p:style>
-          <a:lnRef idx="1">
-            <a:schemeClr val="accent1"/>
-          </a:lnRef>
-          <a:fillRef idx="0">
-            <a:schemeClr val="accent1"/>
-          </a:fillRef>
-          <a:effectRef idx="0">
-            <a:schemeClr val="accent1"/>
-          </a:effectRef>
-          <a:fontRef idx="minor">
-            <a:schemeClr val="tx1"/>
-          </a:fontRef>
-        </p:style>
-      </p:cxnSp>
-      <p:cxnSp>
-        <p:nvCxnSpPr>
-          <p:cNvPr id="36" name="Straight Arrow Connector 35"/>
-          <p:cNvCxnSpPr/>
-          <p:nvPr/>
-        </p:nvCxnSpPr>
-        <p:spPr>
-          <a:xfrm flipH="1">
-            <a:off x="1952626" y="3431717"/>
-            <a:ext cx="2617040" cy="625933"/>
-          </a:xfrm>
-          <a:prstGeom prst="straightConnector1">
-            <a:avLst/>
-          </a:prstGeom>
-          <a:ln w="15875">
-            <a:solidFill>
-              <a:schemeClr val="tx1"/>
-            </a:solidFill>
-            <a:tailEnd type="stealth" w="lg" len="med"/>
-          </a:ln>
-        </p:spPr>
-        <p:style>
-          <a:lnRef idx="1">
-            <a:schemeClr val="accent1"/>
-          </a:lnRef>
-          <a:fillRef idx="0">
-            <a:schemeClr val="accent1"/>
-          </a:fillRef>
-          <a:effectRef idx="0">
-            <a:schemeClr val="accent1"/>
-          </a:effectRef>
-          <a:fontRef idx="minor">
-            <a:schemeClr val="tx1"/>
-          </a:fontRef>
-        </p:style>
-      </p:cxnSp>
-      <p:graphicFrame>
-        <p:nvGraphicFramePr>
-          <p:cNvPr id="28682" name="Object 23"/>
-          <p:cNvGraphicFramePr>
-            <a:graphicFrameLocks noChangeAspect="1"/>
-          </p:cNvGraphicFramePr>
-          <p:nvPr/>
-        </p:nvGraphicFramePr>
-        <p:xfrm>
-          <a:off x="1717675" y="3616325"/>
-          <a:ext cx="282575" cy="422275"/>
-        </p:xfrm>
-        <a:graphic>
-          <a:graphicData uri="http://schemas.openxmlformats.org/presentationml/2006/ole">
-            <p:oleObj spid="_x0000_s28682" name="Equation" r:id="rId11" imgW="152280" imgH="228600" progId="Equation.DSMT4">
-              <p:embed/>
-            </p:oleObj>
-          </a:graphicData>
-        </a:graphic>
-      </p:graphicFrame>
-      <p:sp>
-        <p:nvSpPr>
-          <p:cNvPr id="47" name="TextBox 46"/>
-          <p:cNvSpPr txBox="1"/>
-          <p:nvPr/>
-        </p:nvSpPr>
-        <p:spPr>
-          <a:xfrm>
-            <a:off x="1551991" y="4092058"/>
-            <a:ext cx="961053" cy="523220"/>
-          </a:xfrm>
-          <a:prstGeom prst="rect">
-            <a:avLst/>
-          </a:prstGeom>
-          <a:noFill/>
-        </p:spPr>
-        <p:txBody>
-          <a:bodyPr wrap="square" rtlCol="0">
-            <a:spAutoFit/>
-          </a:bodyPr>
-          <a:lstStyle/>
-          <a:p>
-            <a:r>
-              <a:rPr lang="en-US" sz="1400" dirty="0" smtClean="0">
-                <a:latin typeface="Garamond" pitchFamily="18" charset="0"/>
-              </a:rPr>
-              <a:t>Celestial reference</a:t>
-            </a:r>
-            <a:endParaRPr lang="en-US" sz="1400" dirty="0">
-              <a:latin typeface="Garamond" pitchFamily="18" charset="0"/>
-            </a:endParaRPr>
-          </a:p>
-        </p:txBody>
-      </p:sp>
-      <p:cxnSp>
-        <p:nvCxnSpPr>
-          <p:cNvPr id="48" name="Straight Arrow Connector 47"/>
-          <p:cNvCxnSpPr>
-            <a:stCxn id="66" idx="1"/>
-          </p:cNvCxnSpPr>
-          <p:nvPr/>
-        </p:nvCxnSpPr>
-        <p:spPr>
-          <a:xfrm>
-            <a:off x="4588182" y="3428997"/>
-            <a:ext cx="907743" cy="904878"/>
-          </a:xfrm>
-          <a:prstGeom prst="straightConnector1">
-            <a:avLst/>
-          </a:prstGeom>
-          <a:ln w="15875">
-            <a:solidFill>
-              <a:schemeClr val="tx1"/>
-            </a:solidFill>
-            <a:tailEnd type="stealth" w="lg" len="med"/>
-          </a:ln>
-        </p:spPr>
-        <p:style>
-          <a:lnRef idx="1">
-            <a:schemeClr val="accent1"/>
-          </a:lnRef>
-          <a:fillRef idx="0">
-            <a:schemeClr val="accent1"/>
-          </a:fillRef>
-          <a:effectRef idx="0">
-            <a:schemeClr val="accent1"/>
-          </a:effectRef>
-          <a:fontRef idx="minor">
-            <a:schemeClr val="tx1"/>
-          </a:fontRef>
-        </p:style>
-      </p:cxnSp>
-      <p:graphicFrame>
-        <p:nvGraphicFramePr>
-          <p:cNvPr id="28683" name="Object 23"/>
-          <p:cNvGraphicFramePr>
-            <a:graphicFrameLocks noChangeAspect="1"/>
-          </p:cNvGraphicFramePr>
-          <p:nvPr/>
-        </p:nvGraphicFramePr>
-        <p:xfrm>
-          <a:off x="5146675" y="4083050"/>
-          <a:ext cx="282575" cy="422275"/>
-        </p:xfrm>
-        <a:graphic>
-          <a:graphicData uri="http://schemas.openxmlformats.org/presentationml/2006/ole">
-            <p:oleObj spid="_x0000_s28683" name="Equation" r:id="rId12" imgW="152280" imgH="228600" progId="Equation.DSMT4">
+            <p:oleObj spid="_x0000_s1036" name="Equation" r:id="rId10" imgW="114120" imgH="126720" progId="Equation.DSMT4">
               <p:embed/>
             </p:oleObj>
           </a:graphicData>

</xml_diff>